<commit_message>
2025-07-23 commit, 인터페이스 설계 단계
</commit_message>
<xml_diff>
--- a/To-Do 목록 프로그램(기획서).pptx
+++ b/To-Do 목록 프로그램(기획서).pptx
@@ -7,6 +7,8 @@
   <p:sldIdLst>
     <p:sldId id="256" r:id="rId2"/>
     <p:sldId id="257" r:id="rId3"/>
+    <p:sldId id="258" r:id="rId4"/>
+    <p:sldId id="259" r:id="rId5"/>
   </p:sldIdLst>
   <p:sldSz cx="12192000" cy="6858000"/>
   <p:notesSz cx="6858000" cy="9144000"/>
@@ -111,6 +113,2946 @@
     </p:ext>
   </p:extLst>
 </p:presentation>
+</file>
+
+<file path=ppt/diagrams/colors1.xml><?xml version="1.0" encoding="utf-8"?>
+<dgm:colorsDef xmlns:dgm="http://schemas.openxmlformats.org/drawingml/2006/diagram" xmlns:a="http://schemas.openxmlformats.org/drawingml/2006/main" uniqueId="urn:microsoft.com/office/officeart/2005/8/colors/accent3_2">
+  <dgm:title val=""/>
+  <dgm:desc val=""/>
+  <dgm:catLst>
+    <dgm:cat type="accent3" pri="11200"/>
+  </dgm:catLst>
+  <dgm:styleLbl name="node0">
+    <dgm:fillClrLst meth="repeat">
+      <a:schemeClr val="accent3"/>
+    </dgm:fillClrLst>
+    <dgm:linClrLst meth="repeat">
+      <a:schemeClr val="lt1"/>
+    </dgm:linClrLst>
+    <dgm:effectClrLst/>
+    <dgm:txLinClrLst/>
+    <dgm:txFillClrLst/>
+    <dgm:txEffectClrLst/>
+  </dgm:styleLbl>
+  <dgm:styleLbl name="node1">
+    <dgm:fillClrLst meth="repeat">
+      <a:schemeClr val="accent3"/>
+    </dgm:fillClrLst>
+    <dgm:linClrLst meth="repeat">
+      <a:schemeClr val="lt1"/>
+    </dgm:linClrLst>
+    <dgm:effectClrLst/>
+    <dgm:txLinClrLst/>
+    <dgm:txFillClrLst/>
+    <dgm:txEffectClrLst/>
+  </dgm:styleLbl>
+  <dgm:styleLbl name="alignNode1">
+    <dgm:fillClrLst meth="repeat">
+      <a:schemeClr val="accent3"/>
+    </dgm:fillClrLst>
+    <dgm:linClrLst meth="repeat">
+      <a:schemeClr val="accent3"/>
+    </dgm:linClrLst>
+    <dgm:effectClrLst/>
+    <dgm:txLinClrLst/>
+    <dgm:txFillClrLst/>
+    <dgm:txEffectClrLst/>
+  </dgm:styleLbl>
+  <dgm:styleLbl name="lnNode1">
+    <dgm:fillClrLst meth="repeat">
+      <a:schemeClr val="accent3"/>
+    </dgm:fillClrLst>
+    <dgm:linClrLst meth="repeat">
+      <a:schemeClr val="lt1"/>
+    </dgm:linClrLst>
+    <dgm:effectClrLst/>
+    <dgm:txLinClrLst/>
+    <dgm:txFillClrLst/>
+    <dgm:txEffectClrLst/>
+  </dgm:styleLbl>
+  <dgm:styleLbl name="vennNode1">
+    <dgm:fillClrLst meth="repeat">
+      <a:schemeClr val="accent3">
+        <a:alpha val="50000"/>
+      </a:schemeClr>
+    </dgm:fillClrLst>
+    <dgm:linClrLst meth="repeat">
+      <a:schemeClr val="lt1"/>
+    </dgm:linClrLst>
+    <dgm:effectClrLst/>
+    <dgm:txLinClrLst/>
+    <dgm:txFillClrLst/>
+    <dgm:txEffectClrLst/>
+  </dgm:styleLbl>
+  <dgm:styleLbl name="node2">
+    <dgm:fillClrLst meth="repeat">
+      <a:schemeClr val="accent3"/>
+    </dgm:fillClrLst>
+    <dgm:linClrLst meth="repeat">
+      <a:schemeClr val="lt1"/>
+    </dgm:linClrLst>
+    <dgm:effectClrLst/>
+    <dgm:txLinClrLst/>
+    <dgm:txFillClrLst/>
+    <dgm:txEffectClrLst/>
+  </dgm:styleLbl>
+  <dgm:styleLbl name="node3">
+    <dgm:fillClrLst meth="repeat">
+      <a:schemeClr val="accent3"/>
+    </dgm:fillClrLst>
+    <dgm:linClrLst meth="repeat">
+      <a:schemeClr val="lt1"/>
+    </dgm:linClrLst>
+    <dgm:effectClrLst/>
+    <dgm:txLinClrLst/>
+    <dgm:txFillClrLst/>
+    <dgm:txEffectClrLst/>
+  </dgm:styleLbl>
+  <dgm:styleLbl name="node4">
+    <dgm:fillClrLst meth="repeat">
+      <a:schemeClr val="accent3"/>
+    </dgm:fillClrLst>
+    <dgm:linClrLst meth="repeat">
+      <a:schemeClr val="lt1"/>
+    </dgm:linClrLst>
+    <dgm:effectClrLst/>
+    <dgm:txLinClrLst/>
+    <dgm:txFillClrLst/>
+    <dgm:txEffectClrLst/>
+  </dgm:styleLbl>
+  <dgm:styleLbl name="fgImgPlace1">
+    <dgm:fillClrLst meth="repeat">
+      <a:schemeClr val="accent3">
+        <a:tint val="50000"/>
+      </a:schemeClr>
+    </dgm:fillClrLst>
+    <dgm:linClrLst meth="repeat">
+      <a:schemeClr val="lt1"/>
+    </dgm:linClrLst>
+    <dgm:effectClrLst/>
+    <dgm:txLinClrLst/>
+    <dgm:txFillClrLst meth="repeat">
+      <a:schemeClr val="lt1"/>
+    </dgm:txFillClrLst>
+    <dgm:txEffectClrLst/>
+  </dgm:styleLbl>
+  <dgm:styleLbl name="alignImgPlace1">
+    <dgm:fillClrLst meth="repeat">
+      <a:schemeClr val="accent3">
+        <a:tint val="50000"/>
+      </a:schemeClr>
+    </dgm:fillClrLst>
+    <dgm:linClrLst meth="repeat">
+      <a:schemeClr val="lt1"/>
+    </dgm:linClrLst>
+    <dgm:effectClrLst/>
+    <dgm:txLinClrLst/>
+    <dgm:txFillClrLst meth="repeat">
+      <a:schemeClr val="lt1"/>
+    </dgm:txFillClrLst>
+    <dgm:txEffectClrLst/>
+  </dgm:styleLbl>
+  <dgm:styleLbl name="bgImgPlace1">
+    <dgm:fillClrLst meth="repeat">
+      <a:schemeClr val="accent3">
+        <a:tint val="50000"/>
+      </a:schemeClr>
+    </dgm:fillClrLst>
+    <dgm:linClrLst meth="repeat">
+      <a:schemeClr val="lt1"/>
+    </dgm:linClrLst>
+    <dgm:effectClrLst/>
+    <dgm:txLinClrLst/>
+    <dgm:txFillClrLst meth="repeat">
+      <a:schemeClr val="lt1"/>
+    </dgm:txFillClrLst>
+    <dgm:txEffectClrLst/>
+  </dgm:styleLbl>
+  <dgm:styleLbl name="sibTrans2D1">
+    <dgm:fillClrLst meth="repeat">
+      <a:schemeClr val="accent3">
+        <a:tint val="60000"/>
+      </a:schemeClr>
+    </dgm:fillClrLst>
+    <dgm:linClrLst meth="repeat">
+      <a:schemeClr val="accent3">
+        <a:tint val="60000"/>
+      </a:schemeClr>
+    </dgm:linClrLst>
+    <dgm:effectClrLst/>
+    <dgm:txLinClrLst/>
+    <dgm:txFillClrLst/>
+    <dgm:txEffectClrLst/>
+  </dgm:styleLbl>
+  <dgm:styleLbl name="fgSibTrans2D1">
+    <dgm:fillClrLst meth="repeat">
+      <a:schemeClr val="accent3">
+        <a:tint val="60000"/>
+      </a:schemeClr>
+    </dgm:fillClrLst>
+    <dgm:linClrLst meth="repeat">
+      <a:schemeClr val="accent3">
+        <a:tint val="60000"/>
+      </a:schemeClr>
+    </dgm:linClrLst>
+    <dgm:effectClrLst/>
+    <dgm:txLinClrLst/>
+    <dgm:txFillClrLst/>
+    <dgm:txEffectClrLst/>
+  </dgm:styleLbl>
+  <dgm:styleLbl name="bgSibTrans2D1">
+    <dgm:fillClrLst meth="repeat">
+      <a:schemeClr val="accent3">
+        <a:tint val="60000"/>
+      </a:schemeClr>
+    </dgm:fillClrLst>
+    <dgm:linClrLst meth="repeat">
+      <a:schemeClr val="accent3">
+        <a:tint val="60000"/>
+      </a:schemeClr>
+    </dgm:linClrLst>
+    <dgm:effectClrLst/>
+    <dgm:txLinClrLst/>
+    <dgm:txFillClrLst/>
+    <dgm:txEffectClrLst/>
+  </dgm:styleLbl>
+  <dgm:styleLbl name="sibTrans1D1">
+    <dgm:fillClrLst meth="repeat">
+      <a:schemeClr val="accent3"/>
+    </dgm:fillClrLst>
+    <dgm:linClrLst meth="repeat">
+      <a:schemeClr val="accent3"/>
+    </dgm:linClrLst>
+    <dgm:effectClrLst/>
+    <dgm:txLinClrLst/>
+    <dgm:txFillClrLst meth="repeat">
+      <a:schemeClr val="tx1"/>
+    </dgm:txFillClrLst>
+    <dgm:txEffectClrLst/>
+  </dgm:styleLbl>
+  <dgm:styleLbl name="callout">
+    <dgm:fillClrLst meth="repeat">
+      <a:schemeClr val="accent3"/>
+    </dgm:fillClrLst>
+    <dgm:linClrLst meth="repeat">
+      <a:schemeClr val="accent3">
+        <a:tint val="50000"/>
+      </a:schemeClr>
+    </dgm:linClrLst>
+    <dgm:effectClrLst/>
+    <dgm:txLinClrLst/>
+    <dgm:txFillClrLst meth="repeat">
+      <a:schemeClr val="tx1"/>
+    </dgm:txFillClrLst>
+    <dgm:txEffectClrLst/>
+  </dgm:styleLbl>
+  <dgm:styleLbl name="asst0">
+    <dgm:fillClrLst meth="repeat">
+      <a:schemeClr val="accent3"/>
+    </dgm:fillClrLst>
+    <dgm:linClrLst meth="repeat">
+      <a:schemeClr val="lt1"/>
+    </dgm:linClrLst>
+    <dgm:effectClrLst/>
+    <dgm:txLinClrLst/>
+    <dgm:txFillClrLst/>
+    <dgm:txEffectClrLst/>
+  </dgm:styleLbl>
+  <dgm:styleLbl name="asst1">
+    <dgm:fillClrLst meth="repeat">
+      <a:schemeClr val="accent3"/>
+    </dgm:fillClrLst>
+    <dgm:linClrLst meth="repeat">
+      <a:schemeClr val="lt1"/>
+    </dgm:linClrLst>
+    <dgm:effectClrLst/>
+    <dgm:txLinClrLst/>
+    <dgm:txFillClrLst/>
+    <dgm:txEffectClrLst/>
+  </dgm:styleLbl>
+  <dgm:styleLbl name="asst2">
+    <dgm:fillClrLst meth="repeat">
+      <a:schemeClr val="accent3"/>
+    </dgm:fillClrLst>
+    <dgm:linClrLst meth="repeat">
+      <a:schemeClr val="lt1"/>
+    </dgm:linClrLst>
+    <dgm:effectClrLst/>
+    <dgm:txLinClrLst/>
+    <dgm:txFillClrLst/>
+    <dgm:txEffectClrLst/>
+  </dgm:styleLbl>
+  <dgm:styleLbl name="asst3">
+    <dgm:fillClrLst meth="repeat">
+      <a:schemeClr val="accent3"/>
+    </dgm:fillClrLst>
+    <dgm:linClrLst meth="repeat">
+      <a:schemeClr val="lt1"/>
+    </dgm:linClrLst>
+    <dgm:effectClrLst/>
+    <dgm:txLinClrLst/>
+    <dgm:txFillClrLst/>
+    <dgm:txEffectClrLst/>
+  </dgm:styleLbl>
+  <dgm:styleLbl name="asst4">
+    <dgm:fillClrLst meth="repeat">
+      <a:schemeClr val="accent3"/>
+    </dgm:fillClrLst>
+    <dgm:linClrLst meth="repeat">
+      <a:schemeClr val="lt1"/>
+    </dgm:linClrLst>
+    <dgm:effectClrLst/>
+    <dgm:txLinClrLst/>
+    <dgm:txFillClrLst/>
+    <dgm:txEffectClrLst/>
+  </dgm:styleLbl>
+  <dgm:styleLbl name="parChTrans2D1">
+    <dgm:fillClrLst meth="repeat">
+      <a:schemeClr val="accent3">
+        <a:tint val="60000"/>
+      </a:schemeClr>
+    </dgm:fillClrLst>
+    <dgm:linClrLst meth="repeat">
+      <a:schemeClr val="accent3">
+        <a:tint val="60000"/>
+      </a:schemeClr>
+    </dgm:linClrLst>
+    <dgm:effectClrLst/>
+    <dgm:txLinClrLst/>
+    <dgm:txFillClrLst meth="repeat">
+      <a:schemeClr val="lt1"/>
+    </dgm:txFillClrLst>
+    <dgm:txEffectClrLst/>
+  </dgm:styleLbl>
+  <dgm:styleLbl name="parChTrans2D2">
+    <dgm:fillClrLst meth="repeat">
+      <a:schemeClr val="accent3"/>
+    </dgm:fillClrLst>
+    <dgm:linClrLst meth="repeat">
+      <a:schemeClr val="accent3"/>
+    </dgm:linClrLst>
+    <dgm:effectClrLst/>
+    <dgm:txLinClrLst/>
+    <dgm:txFillClrLst meth="repeat">
+      <a:schemeClr val="lt1"/>
+    </dgm:txFillClrLst>
+    <dgm:txEffectClrLst/>
+  </dgm:styleLbl>
+  <dgm:styleLbl name="parChTrans2D3">
+    <dgm:fillClrLst meth="repeat">
+      <a:schemeClr val="accent3"/>
+    </dgm:fillClrLst>
+    <dgm:linClrLst meth="repeat">
+      <a:schemeClr val="accent3"/>
+    </dgm:linClrLst>
+    <dgm:effectClrLst/>
+    <dgm:txLinClrLst/>
+    <dgm:txFillClrLst meth="repeat">
+      <a:schemeClr val="lt1"/>
+    </dgm:txFillClrLst>
+    <dgm:txEffectClrLst/>
+  </dgm:styleLbl>
+  <dgm:styleLbl name="parChTrans2D4">
+    <dgm:fillClrLst meth="repeat">
+      <a:schemeClr val="accent3"/>
+    </dgm:fillClrLst>
+    <dgm:linClrLst meth="repeat">
+      <a:schemeClr val="accent3"/>
+    </dgm:linClrLst>
+    <dgm:effectClrLst/>
+    <dgm:txLinClrLst/>
+    <dgm:txFillClrLst meth="repeat">
+      <a:schemeClr val="lt1"/>
+    </dgm:txFillClrLst>
+    <dgm:txEffectClrLst/>
+  </dgm:styleLbl>
+  <dgm:styleLbl name="parChTrans1D1">
+    <dgm:fillClrLst meth="repeat">
+      <a:schemeClr val="accent3"/>
+    </dgm:fillClrLst>
+    <dgm:linClrLst meth="repeat">
+      <a:schemeClr val="accent3">
+        <a:shade val="60000"/>
+      </a:schemeClr>
+    </dgm:linClrLst>
+    <dgm:effectClrLst/>
+    <dgm:txLinClrLst/>
+    <dgm:txFillClrLst meth="repeat">
+      <a:schemeClr val="tx1"/>
+    </dgm:txFillClrLst>
+    <dgm:txEffectClrLst/>
+  </dgm:styleLbl>
+  <dgm:styleLbl name="parChTrans1D2">
+    <dgm:fillClrLst meth="repeat">
+      <a:schemeClr val="accent3"/>
+    </dgm:fillClrLst>
+    <dgm:linClrLst meth="repeat">
+      <a:schemeClr val="accent3">
+        <a:shade val="60000"/>
+      </a:schemeClr>
+    </dgm:linClrLst>
+    <dgm:effectClrLst/>
+    <dgm:txLinClrLst/>
+    <dgm:txFillClrLst meth="repeat">
+      <a:schemeClr val="tx1"/>
+    </dgm:txFillClrLst>
+    <dgm:txEffectClrLst/>
+  </dgm:styleLbl>
+  <dgm:styleLbl name="parChTrans1D3">
+    <dgm:fillClrLst meth="repeat">
+      <a:schemeClr val="accent3"/>
+    </dgm:fillClrLst>
+    <dgm:linClrLst meth="repeat">
+      <a:schemeClr val="accent3">
+        <a:shade val="80000"/>
+      </a:schemeClr>
+    </dgm:linClrLst>
+    <dgm:effectClrLst/>
+    <dgm:txLinClrLst/>
+    <dgm:txFillClrLst meth="repeat">
+      <a:schemeClr val="tx1"/>
+    </dgm:txFillClrLst>
+    <dgm:txEffectClrLst/>
+  </dgm:styleLbl>
+  <dgm:styleLbl name="parChTrans1D4">
+    <dgm:fillClrLst meth="repeat">
+      <a:schemeClr val="accent3"/>
+    </dgm:fillClrLst>
+    <dgm:linClrLst meth="repeat">
+      <a:schemeClr val="accent3">
+        <a:shade val="80000"/>
+      </a:schemeClr>
+    </dgm:linClrLst>
+    <dgm:effectClrLst/>
+    <dgm:txLinClrLst/>
+    <dgm:txFillClrLst meth="repeat">
+      <a:schemeClr val="tx1"/>
+    </dgm:txFillClrLst>
+    <dgm:txEffectClrLst/>
+  </dgm:styleLbl>
+  <dgm:styleLbl name="fgAcc1">
+    <dgm:fillClrLst meth="repeat">
+      <a:schemeClr val="lt1">
+        <a:alpha val="90000"/>
+      </a:schemeClr>
+    </dgm:fillClrLst>
+    <dgm:linClrLst meth="repeat">
+      <a:schemeClr val="accent3"/>
+    </dgm:linClrLst>
+    <dgm:effectClrLst/>
+    <dgm:txLinClrLst/>
+    <dgm:txFillClrLst meth="repeat">
+      <a:schemeClr val="dk1"/>
+    </dgm:txFillClrLst>
+    <dgm:txEffectClrLst/>
+  </dgm:styleLbl>
+  <dgm:styleLbl name="conFgAcc1">
+    <dgm:fillClrLst meth="repeat">
+      <a:schemeClr val="lt1">
+        <a:alpha val="90000"/>
+      </a:schemeClr>
+    </dgm:fillClrLst>
+    <dgm:linClrLst meth="repeat">
+      <a:schemeClr val="accent3"/>
+    </dgm:linClrLst>
+    <dgm:effectClrLst/>
+    <dgm:txLinClrLst/>
+    <dgm:txFillClrLst meth="repeat">
+      <a:schemeClr val="dk1"/>
+    </dgm:txFillClrLst>
+    <dgm:txEffectClrLst/>
+  </dgm:styleLbl>
+  <dgm:styleLbl name="alignAcc1">
+    <dgm:fillClrLst meth="repeat">
+      <a:schemeClr val="lt1">
+        <a:alpha val="90000"/>
+      </a:schemeClr>
+    </dgm:fillClrLst>
+    <dgm:linClrLst meth="repeat">
+      <a:schemeClr val="accent3"/>
+    </dgm:linClrLst>
+    <dgm:effectClrLst/>
+    <dgm:txLinClrLst/>
+    <dgm:txFillClrLst meth="repeat">
+      <a:schemeClr val="dk1"/>
+    </dgm:txFillClrLst>
+    <dgm:txEffectClrLst/>
+  </dgm:styleLbl>
+  <dgm:styleLbl name="trAlignAcc1">
+    <dgm:fillClrLst meth="repeat">
+      <a:schemeClr val="lt1">
+        <a:alpha val="40000"/>
+      </a:schemeClr>
+    </dgm:fillClrLst>
+    <dgm:linClrLst meth="repeat">
+      <a:schemeClr val="accent3"/>
+    </dgm:linClrLst>
+    <dgm:effectClrLst/>
+    <dgm:txLinClrLst/>
+    <dgm:txFillClrLst meth="repeat">
+      <a:schemeClr val="dk1"/>
+    </dgm:txFillClrLst>
+    <dgm:txEffectClrLst/>
+  </dgm:styleLbl>
+  <dgm:styleLbl name="bgAcc1">
+    <dgm:fillClrLst meth="repeat">
+      <a:schemeClr val="lt1">
+        <a:alpha val="90000"/>
+      </a:schemeClr>
+    </dgm:fillClrLst>
+    <dgm:linClrLst meth="repeat">
+      <a:schemeClr val="accent3"/>
+    </dgm:linClrLst>
+    <dgm:effectClrLst/>
+    <dgm:txLinClrLst/>
+    <dgm:txFillClrLst meth="repeat">
+      <a:schemeClr val="dk1"/>
+    </dgm:txFillClrLst>
+    <dgm:txEffectClrLst/>
+  </dgm:styleLbl>
+  <dgm:styleLbl name="solidFgAcc1">
+    <dgm:fillClrLst meth="repeat">
+      <a:schemeClr val="lt1"/>
+    </dgm:fillClrLst>
+    <dgm:linClrLst meth="repeat">
+      <a:schemeClr val="accent3"/>
+    </dgm:linClrLst>
+    <dgm:effectClrLst/>
+    <dgm:txLinClrLst/>
+    <dgm:txFillClrLst meth="repeat">
+      <a:schemeClr val="dk1"/>
+    </dgm:txFillClrLst>
+    <dgm:txEffectClrLst/>
+  </dgm:styleLbl>
+  <dgm:styleLbl name="solidAlignAcc1">
+    <dgm:fillClrLst meth="repeat">
+      <a:schemeClr val="lt1"/>
+    </dgm:fillClrLst>
+    <dgm:linClrLst meth="repeat">
+      <a:schemeClr val="accent3"/>
+    </dgm:linClrLst>
+    <dgm:effectClrLst/>
+    <dgm:txLinClrLst/>
+    <dgm:txFillClrLst meth="repeat">
+      <a:schemeClr val="dk1"/>
+    </dgm:txFillClrLst>
+    <dgm:txEffectClrLst/>
+  </dgm:styleLbl>
+  <dgm:styleLbl name="solidBgAcc1">
+    <dgm:fillClrLst meth="repeat">
+      <a:schemeClr val="lt1"/>
+    </dgm:fillClrLst>
+    <dgm:linClrLst meth="repeat">
+      <a:schemeClr val="accent3"/>
+    </dgm:linClrLst>
+    <dgm:effectClrLst/>
+    <dgm:txLinClrLst/>
+    <dgm:txFillClrLst meth="repeat">
+      <a:schemeClr val="dk1"/>
+    </dgm:txFillClrLst>
+    <dgm:txEffectClrLst/>
+  </dgm:styleLbl>
+  <dgm:styleLbl name="fgAccFollowNode1">
+    <dgm:fillClrLst meth="repeat">
+      <a:schemeClr val="accent3">
+        <a:alpha val="90000"/>
+        <a:tint val="40000"/>
+      </a:schemeClr>
+    </dgm:fillClrLst>
+    <dgm:linClrLst meth="repeat">
+      <a:schemeClr val="accent3">
+        <a:alpha val="90000"/>
+        <a:tint val="40000"/>
+      </a:schemeClr>
+    </dgm:linClrLst>
+    <dgm:effectClrLst/>
+    <dgm:txLinClrLst/>
+    <dgm:txFillClrLst meth="repeat">
+      <a:schemeClr val="dk1"/>
+    </dgm:txFillClrLst>
+    <dgm:txEffectClrLst/>
+  </dgm:styleLbl>
+  <dgm:styleLbl name="alignAccFollowNode1">
+    <dgm:fillClrLst meth="repeat">
+      <a:schemeClr val="accent3">
+        <a:alpha val="90000"/>
+        <a:tint val="40000"/>
+      </a:schemeClr>
+    </dgm:fillClrLst>
+    <dgm:linClrLst meth="repeat">
+      <a:schemeClr val="accent3">
+        <a:alpha val="90000"/>
+        <a:tint val="40000"/>
+      </a:schemeClr>
+    </dgm:linClrLst>
+    <dgm:effectClrLst/>
+    <dgm:txLinClrLst/>
+    <dgm:txFillClrLst meth="repeat">
+      <a:schemeClr val="dk1"/>
+    </dgm:txFillClrLst>
+    <dgm:txEffectClrLst/>
+  </dgm:styleLbl>
+  <dgm:styleLbl name="bgAccFollowNode1">
+    <dgm:fillClrLst meth="repeat">
+      <a:schemeClr val="accent3">
+        <a:alpha val="90000"/>
+        <a:tint val="40000"/>
+      </a:schemeClr>
+    </dgm:fillClrLst>
+    <dgm:linClrLst meth="repeat">
+      <a:schemeClr val="accent3">
+        <a:alpha val="90000"/>
+        <a:tint val="40000"/>
+      </a:schemeClr>
+    </dgm:linClrLst>
+    <dgm:effectClrLst/>
+    <dgm:txLinClrLst/>
+    <dgm:txFillClrLst meth="repeat">
+      <a:schemeClr val="dk1"/>
+    </dgm:txFillClrLst>
+    <dgm:txEffectClrLst/>
+  </dgm:styleLbl>
+  <dgm:styleLbl name="fgAcc0">
+    <dgm:fillClrLst meth="repeat">
+      <a:schemeClr val="lt1">
+        <a:alpha val="90000"/>
+      </a:schemeClr>
+    </dgm:fillClrLst>
+    <dgm:linClrLst meth="repeat">
+      <a:schemeClr val="accent3"/>
+    </dgm:linClrLst>
+    <dgm:effectClrLst/>
+    <dgm:txLinClrLst/>
+    <dgm:txFillClrLst meth="repeat">
+      <a:schemeClr val="dk1"/>
+    </dgm:txFillClrLst>
+    <dgm:txEffectClrLst/>
+  </dgm:styleLbl>
+  <dgm:styleLbl name="fgAcc2">
+    <dgm:fillClrLst meth="repeat">
+      <a:schemeClr val="lt1">
+        <a:alpha val="90000"/>
+      </a:schemeClr>
+    </dgm:fillClrLst>
+    <dgm:linClrLst meth="repeat">
+      <a:schemeClr val="accent3"/>
+    </dgm:linClrLst>
+    <dgm:effectClrLst/>
+    <dgm:txLinClrLst/>
+    <dgm:txFillClrLst meth="repeat">
+      <a:schemeClr val="dk1"/>
+    </dgm:txFillClrLst>
+    <dgm:txEffectClrLst/>
+  </dgm:styleLbl>
+  <dgm:styleLbl name="fgAcc3">
+    <dgm:fillClrLst meth="repeat">
+      <a:schemeClr val="lt1">
+        <a:alpha val="90000"/>
+      </a:schemeClr>
+    </dgm:fillClrLst>
+    <dgm:linClrLst meth="repeat">
+      <a:schemeClr val="accent3"/>
+    </dgm:linClrLst>
+    <dgm:effectClrLst/>
+    <dgm:txLinClrLst/>
+    <dgm:txFillClrLst meth="repeat">
+      <a:schemeClr val="dk1"/>
+    </dgm:txFillClrLst>
+    <dgm:txEffectClrLst/>
+  </dgm:styleLbl>
+  <dgm:styleLbl name="fgAcc4">
+    <dgm:fillClrLst meth="repeat">
+      <a:schemeClr val="lt1">
+        <a:alpha val="90000"/>
+      </a:schemeClr>
+    </dgm:fillClrLst>
+    <dgm:linClrLst meth="repeat">
+      <a:schemeClr val="accent3"/>
+    </dgm:linClrLst>
+    <dgm:effectClrLst/>
+    <dgm:txLinClrLst/>
+    <dgm:txFillClrLst meth="repeat">
+      <a:schemeClr val="dk1"/>
+    </dgm:txFillClrLst>
+    <dgm:txEffectClrLst/>
+  </dgm:styleLbl>
+  <dgm:styleLbl name="bgShp">
+    <dgm:fillClrLst meth="repeat">
+      <a:schemeClr val="accent3">
+        <a:tint val="40000"/>
+      </a:schemeClr>
+    </dgm:fillClrLst>
+    <dgm:linClrLst meth="repeat">
+      <a:schemeClr val="accent3"/>
+    </dgm:linClrLst>
+    <dgm:effectClrLst/>
+    <dgm:txLinClrLst/>
+    <dgm:txFillClrLst meth="repeat">
+      <a:schemeClr val="dk1"/>
+    </dgm:txFillClrLst>
+    <dgm:txEffectClrLst/>
+  </dgm:styleLbl>
+  <dgm:styleLbl name="dkBgShp">
+    <dgm:fillClrLst meth="repeat">
+      <a:schemeClr val="accent3">
+        <a:shade val="80000"/>
+      </a:schemeClr>
+    </dgm:fillClrLst>
+    <dgm:linClrLst meth="repeat">
+      <a:schemeClr val="accent3"/>
+    </dgm:linClrLst>
+    <dgm:effectClrLst/>
+    <dgm:txLinClrLst/>
+    <dgm:txFillClrLst meth="repeat">
+      <a:schemeClr val="lt1"/>
+    </dgm:txFillClrLst>
+    <dgm:txEffectClrLst/>
+  </dgm:styleLbl>
+  <dgm:styleLbl name="trBgShp">
+    <dgm:fillClrLst meth="repeat">
+      <a:schemeClr val="accent3">
+        <a:tint val="50000"/>
+        <a:alpha val="40000"/>
+      </a:schemeClr>
+    </dgm:fillClrLst>
+    <dgm:linClrLst meth="repeat">
+      <a:schemeClr val="accent3"/>
+    </dgm:linClrLst>
+    <dgm:effectClrLst/>
+    <dgm:txLinClrLst/>
+    <dgm:txFillClrLst meth="repeat">
+      <a:schemeClr val="lt1"/>
+    </dgm:txFillClrLst>
+    <dgm:txEffectClrLst/>
+  </dgm:styleLbl>
+  <dgm:styleLbl name="fgShp">
+    <dgm:fillClrLst meth="repeat">
+      <a:schemeClr val="accent3">
+        <a:tint val="60000"/>
+      </a:schemeClr>
+    </dgm:fillClrLst>
+    <dgm:linClrLst meth="repeat">
+      <a:schemeClr val="lt1"/>
+    </dgm:linClrLst>
+    <dgm:effectClrLst/>
+    <dgm:txLinClrLst/>
+    <dgm:txFillClrLst meth="repeat">
+      <a:schemeClr val="dk1"/>
+    </dgm:txFillClrLst>
+    <dgm:txEffectClrLst/>
+  </dgm:styleLbl>
+  <dgm:styleLbl name="revTx">
+    <dgm:fillClrLst meth="repeat">
+      <a:schemeClr val="lt1">
+        <a:alpha val="0"/>
+      </a:schemeClr>
+    </dgm:fillClrLst>
+    <dgm:linClrLst meth="repeat">
+      <a:schemeClr val="dk1">
+        <a:alpha val="0"/>
+      </a:schemeClr>
+    </dgm:linClrLst>
+    <dgm:effectClrLst/>
+    <dgm:txLinClrLst/>
+    <dgm:txFillClrLst meth="repeat">
+      <a:schemeClr val="tx1"/>
+    </dgm:txFillClrLst>
+    <dgm:txEffectClrLst/>
+  </dgm:styleLbl>
+</dgm:colorsDef>
+</file>
+
+<file path=ppt/diagrams/data1.xml><?xml version="1.0" encoding="utf-8"?>
+<dgm:dataModel xmlns:dgm="http://schemas.openxmlformats.org/drawingml/2006/diagram" xmlns:a="http://schemas.openxmlformats.org/drawingml/2006/main">
+  <dgm:ptLst>
+    <dgm:pt modelId="{480D3DC5-6F63-45E3-80CA-A57D23365315}" type="doc">
+      <dgm:prSet loTypeId="urn:microsoft.com/office/officeart/2005/8/layout/hierarchy1" loCatId="hierarchy" qsTypeId="urn:microsoft.com/office/officeart/2005/8/quickstyle/simple4" qsCatId="simple" csTypeId="urn:microsoft.com/office/officeart/2005/8/colors/accent3_2" csCatId="accent3" phldr="1"/>
+      <dgm:spPr/>
+      <dgm:t>
+        <a:bodyPr/>
+        <a:lstStyle/>
+        <a:p>
+          <a:endParaRPr lang="en-US"/>
+        </a:p>
+      </dgm:t>
+    </dgm:pt>
+    <dgm:pt modelId="{745D9D62-1E10-4DDC-969D-B7292CD9D123}">
+      <dgm:prSet/>
+      <dgm:spPr/>
+      <dgm:t>
+        <a:bodyPr/>
+        <a:lstStyle/>
+        <a:p>
+          <a:pPr>
+            <a:defRPr cap="all"/>
+          </a:pPr>
+          <a:r>
+            <a:rPr lang="ko-KR" dirty="0"/>
+            <a:t>프로젝트 개요</a:t>
+          </a:r>
+          <a:endParaRPr lang="en-US" dirty="0"/>
+        </a:p>
+      </dgm:t>
+    </dgm:pt>
+    <dgm:pt modelId="{6703A517-1966-487C-9428-C68A3B762B3F}" type="parTrans" cxnId="{00252AFF-EEAE-4923-811B-AA8E8D8A98DE}">
+      <dgm:prSet/>
+      <dgm:spPr/>
+      <dgm:t>
+        <a:bodyPr/>
+        <a:lstStyle/>
+        <a:p>
+          <a:endParaRPr lang="en-US"/>
+        </a:p>
+      </dgm:t>
+    </dgm:pt>
+    <dgm:pt modelId="{4A746028-8EBC-4B2E-997E-E5E0FF463B5B}" type="sibTrans" cxnId="{00252AFF-EEAE-4923-811B-AA8E8D8A98DE}">
+      <dgm:prSet/>
+      <dgm:spPr/>
+      <dgm:t>
+        <a:bodyPr/>
+        <a:lstStyle/>
+        <a:p>
+          <a:endParaRPr lang="en-US"/>
+        </a:p>
+      </dgm:t>
+    </dgm:pt>
+    <dgm:pt modelId="{CB03D998-E3C1-4E26-AF6C-AB82E69A7EEC}">
+      <dgm:prSet/>
+      <dgm:spPr/>
+      <dgm:t>
+        <a:bodyPr/>
+        <a:lstStyle/>
+        <a:p>
+          <a:pPr>
+            <a:defRPr cap="all"/>
+          </a:pPr>
+          <a:r>
+            <a:rPr lang="ko-KR"/>
+            <a:t>개발 환경</a:t>
+          </a:r>
+          <a:endParaRPr lang="en-US"/>
+        </a:p>
+      </dgm:t>
+    </dgm:pt>
+    <dgm:pt modelId="{479BD9E7-B24D-41CC-A547-69635D2AD6AA}" type="parTrans" cxnId="{4D11CE34-7D08-4630-ADDC-FF86007C61A4}">
+      <dgm:prSet/>
+      <dgm:spPr/>
+      <dgm:t>
+        <a:bodyPr/>
+        <a:lstStyle/>
+        <a:p>
+          <a:endParaRPr lang="en-US"/>
+        </a:p>
+      </dgm:t>
+    </dgm:pt>
+    <dgm:pt modelId="{458C664E-9CFC-46B3-BF8C-F8BC3716FE9E}" type="sibTrans" cxnId="{4D11CE34-7D08-4630-ADDC-FF86007C61A4}">
+      <dgm:prSet/>
+      <dgm:spPr/>
+      <dgm:t>
+        <a:bodyPr/>
+        <a:lstStyle/>
+        <a:p>
+          <a:endParaRPr lang="en-US"/>
+        </a:p>
+      </dgm:t>
+    </dgm:pt>
+    <dgm:pt modelId="{FCDD6A3A-4EF0-465D-8E0D-B4184F0D0C38}" type="pres">
+      <dgm:prSet presAssocID="{480D3DC5-6F63-45E3-80CA-A57D23365315}" presName="hierChild1" presStyleCnt="0">
+        <dgm:presLayoutVars>
+          <dgm:chPref val="1"/>
+          <dgm:dir/>
+          <dgm:animOne val="branch"/>
+          <dgm:animLvl val="lvl"/>
+          <dgm:resizeHandles/>
+        </dgm:presLayoutVars>
+      </dgm:prSet>
+      <dgm:spPr/>
+    </dgm:pt>
+    <dgm:pt modelId="{2CD91067-BC70-4631-A5EB-F5F9B54F323D}" type="pres">
+      <dgm:prSet presAssocID="{745D9D62-1E10-4DDC-969D-B7292CD9D123}" presName="hierRoot1" presStyleCnt="0"/>
+      <dgm:spPr/>
+    </dgm:pt>
+    <dgm:pt modelId="{F79CAEBF-E1D7-4E2D-ACAE-A26BE08F9D3E}" type="pres">
+      <dgm:prSet presAssocID="{745D9D62-1E10-4DDC-969D-B7292CD9D123}" presName="composite" presStyleCnt="0"/>
+      <dgm:spPr/>
+    </dgm:pt>
+    <dgm:pt modelId="{E84608DF-E2A4-4DFA-B284-C8F81FD1D6E2}" type="pres">
+      <dgm:prSet presAssocID="{745D9D62-1E10-4DDC-969D-B7292CD9D123}" presName="background" presStyleLbl="node0" presStyleIdx="0" presStyleCnt="2"/>
+      <dgm:spPr/>
+    </dgm:pt>
+    <dgm:pt modelId="{B443541F-2733-4E2B-A95C-0FA7178CE71D}" type="pres">
+      <dgm:prSet presAssocID="{745D9D62-1E10-4DDC-969D-B7292CD9D123}" presName="text" presStyleLbl="fgAcc0" presStyleIdx="0" presStyleCnt="2">
+        <dgm:presLayoutVars>
+          <dgm:chPref val="3"/>
+        </dgm:presLayoutVars>
+      </dgm:prSet>
+      <dgm:spPr/>
+    </dgm:pt>
+    <dgm:pt modelId="{B79C560C-DEBE-47D1-811D-3A8A979EF1C1}" type="pres">
+      <dgm:prSet presAssocID="{745D9D62-1E10-4DDC-969D-B7292CD9D123}" presName="hierChild2" presStyleCnt="0"/>
+      <dgm:spPr/>
+    </dgm:pt>
+    <dgm:pt modelId="{09D6583A-DBDA-4C42-BB49-109CDB8965F7}" type="pres">
+      <dgm:prSet presAssocID="{CB03D998-E3C1-4E26-AF6C-AB82E69A7EEC}" presName="hierRoot1" presStyleCnt="0"/>
+      <dgm:spPr/>
+    </dgm:pt>
+    <dgm:pt modelId="{333468AC-A013-40EA-8F33-4C6497753947}" type="pres">
+      <dgm:prSet presAssocID="{CB03D998-E3C1-4E26-AF6C-AB82E69A7EEC}" presName="composite" presStyleCnt="0"/>
+      <dgm:spPr/>
+    </dgm:pt>
+    <dgm:pt modelId="{AF3EDC48-93B6-45E3-A2E1-8930BFEF864E}" type="pres">
+      <dgm:prSet presAssocID="{CB03D998-E3C1-4E26-AF6C-AB82E69A7EEC}" presName="background" presStyleLbl="node0" presStyleIdx="1" presStyleCnt="2"/>
+      <dgm:spPr/>
+    </dgm:pt>
+    <dgm:pt modelId="{EC79FAE1-D6F6-4DF4-88A1-80C7E3C9D53D}" type="pres">
+      <dgm:prSet presAssocID="{CB03D998-E3C1-4E26-AF6C-AB82E69A7EEC}" presName="text" presStyleLbl="fgAcc0" presStyleIdx="1" presStyleCnt="2">
+        <dgm:presLayoutVars>
+          <dgm:chPref val="3"/>
+        </dgm:presLayoutVars>
+      </dgm:prSet>
+      <dgm:spPr/>
+    </dgm:pt>
+    <dgm:pt modelId="{34C20DCC-1EFE-47A1-BA7B-0E3B5DD89B13}" type="pres">
+      <dgm:prSet presAssocID="{CB03D998-E3C1-4E26-AF6C-AB82E69A7EEC}" presName="hierChild2" presStyleCnt="0"/>
+      <dgm:spPr/>
+    </dgm:pt>
+  </dgm:ptLst>
+  <dgm:cxnLst>
+    <dgm:cxn modelId="{C0595930-3C61-4499-A70D-61DB005A5D91}" type="presOf" srcId="{CB03D998-E3C1-4E26-AF6C-AB82E69A7EEC}" destId="{EC79FAE1-D6F6-4DF4-88A1-80C7E3C9D53D}" srcOrd="0" destOrd="0" presId="urn:microsoft.com/office/officeart/2005/8/layout/hierarchy1"/>
+    <dgm:cxn modelId="{4D11CE34-7D08-4630-ADDC-FF86007C61A4}" srcId="{480D3DC5-6F63-45E3-80CA-A57D23365315}" destId="{CB03D998-E3C1-4E26-AF6C-AB82E69A7EEC}" srcOrd="1" destOrd="0" parTransId="{479BD9E7-B24D-41CC-A547-69635D2AD6AA}" sibTransId="{458C664E-9CFC-46B3-BF8C-F8BC3716FE9E}"/>
+    <dgm:cxn modelId="{07F86765-B7B0-4BA7-9C37-3B7FDAD5D9CF}" type="presOf" srcId="{480D3DC5-6F63-45E3-80CA-A57D23365315}" destId="{FCDD6A3A-4EF0-465D-8E0D-B4184F0D0C38}" srcOrd="0" destOrd="0" presId="urn:microsoft.com/office/officeart/2005/8/layout/hierarchy1"/>
+    <dgm:cxn modelId="{A7875FA7-573B-4AD5-BD02-DB8AD7727394}" type="presOf" srcId="{745D9D62-1E10-4DDC-969D-B7292CD9D123}" destId="{B443541F-2733-4E2B-A95C-0FA7178CE71D}" srcOrd="0" destOrd="0" presId="urn:microsoft.com/office/officeart/2005/8/layout/hierarchy1"/>
+    <dgm:cxn modelId="{00252AFF-EEAE-4923-811B-AA8E8D8A98DE}" srcId="{480D3DC5-6F63-45E3-80CA-A57D23365315}" destId="{745D9D62-1E10-4DDC-969D-B7292CD9D123}" srcOrd="0" destOrd="0" parTransId="{6703A517-1966-487C-9428-C68A3B762B3F}" sibTransId="{4A746028-8EBC-4B2E-997E-E5E0FF463B5B}"/>
+    <dgm:cxn modelId="{71811532-AFEF-466E-A604-B5D810AE1929}" type="presParOf" srcId="{FCDD6A3A-4EF0-465D-8E0D-B4184F0D0C38}" destId="{2CD91067-BC70-4631-A5EB-F5F9B54F323D}" srcOrd="0" destOrd="0" presId="urn:microsoft.com/office/officeart/2005/8/layout/hierarchy1"/>
+    <dgm:cxn modelId="{6DBE8A1A-7EB8-4FF3-938F-D85D7B43B86F}" type="presParOf" srcId="{2CD91067-BC70-4631-A5EB-F5F9B54F323D}" destId="{F79CAEBF-E1D7-4E2D-ACAE-A26BE08F9D3E}" srcOrd="0" destOrd="0" presId="urn:microsoft.com/office/officeart/2005/8/layout/hierarchy1"/>
+    <dgm:cxn modelId="{4C10DD29-3933-4796-9756-050257148CA9}" type="presParOf" srcId="{F79CAEBF-E1D7-4E2D-ACAE-A26BE08F9D3E}" destId="{E84608DF-E2A4-4DFA-B284-C8F81FD1D6E2}" srcOrd="0" destOrd="0" presId="urn:microsoft.com/office/officeart/2005/8/layout/hierarchy1"/>
+    <dgm:cxn modelId="{014C8740-DEF3-463D-9EA2-0B3E94C7A0C1}" type="presParOf" srcId="{F79CAEBF-E1D7-4E2D-ACAE-A26BE08F9D3E}" destId="{B443541F-2733-4E2B-A95C-0FA7178CE71D}" srcOrd="1" destOrd="0" presId="urn:microsoft.com/office/officeart/2005/8/layout/hierarchy1"/>
+    <dgm:cxn modelId="{B6B264E1-5EA4-490A-9D51-6E6E647C45C9}" type="presParOf" srcId="{2CD91067-BC70-4631-A5EB-F5F9B54F323D}" destId="{B79C560C-DEBE-47D1-811D-3A8A979EF1C1}" srcOrd="1" destOrd="0" presId="urn:microsoft.com/office/officeart/2005/8/layout/hierarchy1"/>
+    <dgm:cxn modelId="{A2B21C48-0871-4321-96FC-A1E89995E6C5}" type="presParOf" srcId="{FCDD6A3A-4EF0-465D-8E0D-B4184F0D0C38}" destId="{09D6583A-DBDA-4C42-BB49-109CDB8965F7}" srcOrd="1" destOrd="0" presId="urn:microsoft.com/office/officeart/2005/8/layout/hierarchy1"/>
+    <dgm:cxn modelId="{9E60205B-E18D-4D96-AD85-27AC00D4697F}" type="presParOf" srcId="{09D6583A-DBDA-4C42-BB49-109CDB8965F7}" destId="{333468AC-A013-40EA-8F33-4C6497753947}" srcOrd="0" destOrd="0" presId="urn:microsoft.com/office/officeart/2005/8/layout/hierarchy1"/>
+    <dgm:cxn modelId="{4AD62EF9-7F46-4CE5-BCAF-B0D0FA9866EB}" type="presParOf" srcId="{333468AC-A013-40EA-8F33-4C6497753947}" destId="{AF3EDC48-93B6-45E3-A2E1-8930BFEF864E}" srcOrd="0" destOrd="0" presId="urn:microsoft.com/office/officeart/2005/8/layout/hierarchy1"/>
+    <dgm:cxn modelId="{CB0413E5-DDEA-4597-80C7-B2E9FAD0CC89}" type="presParOf" srcId="{333468AC-A013-40EA-8F33-4C6497753947}" destId="{EC79FAE1-D6F6-4DF4-88A1-80C7E3C9D53D}" srcOrd="1" destOrd="0" presId="urn:microsoft.com/office/officeart/2005/8/layout/hierarchy1"/>
+    <dgm:cxn modelId="{DD16F701-8F7C-46EE-B5AF-65F0CA650DE9}" type="presParOf" srcId="{09D6583A-DBDA-4C42-BB49-109CDB8965F7}" destId="{34C20DCC-1EFE-47A1-BA7B-0E3B5DD89B13}" srcOrd="1" destOrd="0" presId="urn:microsoft.com/office/officeart/2005/8/layout/hierarchy1"/>
+  </dgm:cxnLst>
+  <dgm:bg/>
+  <dgm:whole/>
+  <dgm:extLst>
+    <a:ext uri="http://schemas.microsoft.com/office/drawing/2008/diagram">
+      <dsp:dataModelExt xmlns:dsp="http://schemas.microsoft.com/office/drawing/2008/diagram" relId="rId7" minVer="http://schemas.openxmlformats.org/drawingml/2006/diagram"/>
+    </a:ext>
+  </dgm:extLst>
+</dgm:dataModel>
+</file>
+
+<file path=ppt/diagrams/drawing1.xml><?xml version="1.0" encoding="utf-8"?>
+<dsp:drawing xmlns:dgm="http://schemas.openxmlformats.org/drawingml/2006/diagram" xmlns:dsp="http://schemas.microsoft.com/office/drawing/2008/diagram" xmlns:a="http://schemas.openxmlformats.org/drawingml/2006/main">
+  <dsp:spTree>
+    <dsp:nvGrpSpPr>
+      <dsp:cNvPr id="0" name=""/>
+      <dsp:cNvGrpSpPr/>
+    </dsp:nvGrpSpPr>
+    <dsp:grpSpPr/>
+    <dsp:sp modelId="{E84608DF-E2A4-4DFA-B284-C8F81FD1D6E2}">
+      <dsp:nvSpPr>
+        <dsp:cNvPr id="0" name=""/>
+        <dsp:cNvSpPr/>
+      </dsp:nvSpPr>
+      <dsp:spPr>
+        <a:xfrm>
+          <a:off x="628" y="1446873"/>
+          <a:ext cx="2204471" cy="1399839"/>
+        </a:xfrm>
+        <a:prstGeom prst="roundRect">
+          <a:avLst>
+            <a:gd name="adj" fmla="val 10000"/>
+          </a:avLst>
+        </a:prstGeom>
+        <a:gradFill rotWithShape="0">
+          <a:gsLst>
+            <a:gs pos="0">
+              <a:schemeClr val="accent3">
+                <a:hueOff val="0"/>
+                <a:satOff val="0"/>
+                <a:lumOff val="0"/>
+                <a:alphaOff val="0"/>
+                <a:tint val="92000"/>
+                <a:shade val="100000"/>
+                <a:satMod val="170000"/>
+              </a:schemeClr>
+            </a:gs>
+            <a:gs pos="15000">
+              <a:schemeClr val="accent3">
+                <a:hueOff val="0"/>
+                <a:satOff val="0"/>
+                <a:lumOff val="0"/>
+                <a:alphaOff val="0"/>
+                <a:tint val="92000"/>
+                <a:shade val="99000"/>
+                <a:satMod val="170000"/>
+              </a:schemeClr>
+            </a:gs>
+            <a:gs pos="62000">
+              <a:schemeClr val="accent3">
+                <a:hueOff val="0"/>
+                <a:satOff val="0"/>
+                <a:lumOff val="0"/>
+                <a:alphaOff val="0"/>
+                <a:tint val="96000"/>
+                <a:shade val="80000"/>
+                <a:satMod val="170000"/>
+              </a:schemeClr>
+            </a:gs>
+            <a:gs pos="97000">
+              <a:schemeClr val="accent3">
+                <a:hueOff val="0"/>
+                <a:satOff val="0"/>
+                <a:lumOff val="0"/>
+                <a:alphaOff val="0"/>
+                <a:tint val="98000"/>
+                <a:shade val="63000"/>
+                <a:satMod val="170000"/>
+              </a:schemeClr>
+            </a:gs>
+            <a:gs pos="100000">
+              <a:schemeClr val="accent3">
+                <a:hueOff val="0"/>
+                <a:satOff val="0"/>
+                <a:lumOff val="0"/>
+                <a:alphaOff val="0"/>
+                <a:shade val="62000"/>
+                <a:satMod val="170000"/>
+              </a:schemeClr>
+            </a:gs>
+          </a:gsLst>
+          <a:path path="circle">
+            <a:fillToRect l="50000" t="50000" r="50000" b="50000"/>
+          </a:path>
+        </a:gradFill>
+        <a:ln>
+          <a:noFill/>
+        </a:ln>
+        <a:effectLst>
+          <a:outerShdw blurRad="63500" dist="25400" dir="5400000" sx="102000" sy="102000" rotWithShape="0">
+            <a:srgbClr val="000000">
+              <a:alpha val="40000"/>
+            </a:srgbClr>
+          </a:outerShdw>
+        </a:effectLst>
+        <a:scene3d>
+          <a:camera prst="orthographicFront">
+            <a:rot lat="0" lon="0" rev="0"/>
+          </a:camera>
+          <a:lightRig rig="glow" dir="tl">
+            <a:rot lat="0" lon="0" rev="6600000"/>
+          </a:lightRig>
+        </a:scene3d>
+        <a:sp3d contourW="12700" prstMaterial="dkEdge">
+          <a:bevelT w="31750" h="19050" prst="softRound"/>
+          <a:contourClr>
+            <a:schemeClr val="accent3">
+              <a:hueOff val="0"/>
+              <a:satOff val="0"/>
+              <a:lumOff val="0"/>
+              <a:alphaOff val="0"/>
+            </a:schemeClr>
+          </a:contourClr>
+        </a:sp3d>
+      </dsp:spPr>
+      <dsp:style>
+        <a:lnRef idx="0">
+          <a:scrgbClr r="0" g="0" b="0"/>
+        </a:lnRef>
+        <a:fillRef idx="3">
+          <a:scrgbClr r="0" g="0" b="0"/>
+        </a:fillRef>
+        <a:effectRef idx="2">
+          <a:scrgbClr r="0" g="0" b="0"/>
+        </a:effectRef>
+        <a:fontRef idx="minor">
+          <a:schemeClr val="lt1"/>
+        </a:fontRef>
+      </dsp:style>
+    </dsp:sp>
+    <dsp:sp modelId="{B443541F-2733-4E2B-A95C-0FA7178CE71D}">
+      <dsp:nvSpPr>
+        <dsp:cNvPr id="0" name=""/>
+        <dsp:cNvSpPr/>
+      </dsp:nvSpPr>
+      <dsp:spPr>
+        <a:xfrm>
+          <a:off x="245569" y="1679567"/>
+          <a:ext cx="2204471" cy="1399839"/>
+        </a:xfrm>
+        <a:prstGeom prst="roundRect">
+          <a:avLst>
+            <a:gd name="adj" fmla="val 10000"/>
+          </a:avLst>
+        </a:prstGeom>
+        <a:solidFill>
+          <a:schemeClr val="lt1">
+            <a:alpha val="90000"/>
+            <a:hueOff val="0"/>
+            <a:satOff val="0"/>
+            <a:lumOff val="0"/>
+            <a:alphaOff val="0"/>
+          </a:schemeClr>
+        </a:solidFill>
+        <a:ln w="9525" cap="flat" cmpd="sng" algn="ctr">
+          <a:solidFill>
+            <a:schemeClr val="accent3">
+              <a:hueOff val="0"/>
+              <a:satOff val="0"/>
+              <a:lumOff val="0"/>
+              <a:alphaOff val="0"/>
+            </a:schemeClr>
+          </a:solidFill>
+          <a:prstDash val="solid"/>
+        </a:ln>
+        <a:effectLst/>
+      </dsp:spPr>
+      <dsp:style>
+        <a:lnRef idx="1">
+          <a:scrgbClr r="0" g="0" b="0"/>
+        </a:lnRef>
+        <a:fillRef idx="1">
+          <a:scrgbClr r="0" g="0" b="0"/>
+        </a:fillRef>
+        <a:effectRef idx="0">
+          <a:scrgbClr r="0" g="0" b="0"/>
+        </a:effectRef>
+        <a:fontRef idx="minor"/>
+      </dsp:style>
+      <dsp:txBody>
+        <a:bodyPr spcFirstLastPara="0" vert="horz" wrap="square" lIns="102870" tIns="102870" rIns="102870" bIns="102870" numCol="1" spcCol="1270" anchor="ctr" anchorCtr="0">
+          <a:noAutofit/>
+        </a:bodyPr>
+        <a:lstStyle/>
+        <a:p>
+          <a:pPr marL="0" lvl="0" indent="0" algn="ctr" defTabSz="1200150">
+            <a:lnSpc>
+              <a:spcPct val="90000"/>
+            </a:lnSpc>
+            <a:spcBef>
+              <a:spcPct val="0"/>
+            </a:spcBef>
+            <a:spcAft>
+              <a:spcPct val="35000"/>
+            </a:spcAft>
+            <a:buNone/>
+            <a:defRPr cap="all"/>
+          </a:pPr>
+          <a:r>
+            <a:rPr lang="ko-KR" sz="2700" kern="1200" dirty="0"/>
+            <a:t>프로젝트 개요</a:t>
+          </a:r>
+          <a:endParaRPr lang="en-US" sz="2700" kern="1200" dirty="0"/>
+        </a:p>
+      </dsp:txBody>
+      <dsp:txXfrm>
+        <a:off x="286569" y="1720567"/>
+        <a:ext cx="2122471" cy="1317839"/>
+      </dsp:txXfrm>
+    </dsp:sp>
+    <dsp:sp modelId="{AF3EDC48-93B6-45E3-A2E1-8930BFEF864E}">
+      <dsp:nvSpPr>
+        <dsp:cNvPr id="0" name=""/>
+        <dsp:cNvSpPr/>
+      </dsp:nvSpPr>
+      <dsp:spPr>
+        <a:xfrm>
+          <a:off x="2694982" y="1446873"/>
+          <a:ext cx="2204471" cy="1399839"/>
+        </a:xfrm>
+        <a:prstGeom prst="roundRect">
+          <a:avLst>
+            <a:gd name="adj" fmla="val 10000"/>
+          </a:avLst>
+        </a:prstGeom>
+        <a:gradFill rotWithShape="0">
+          <a:gsLst>
+            <a:gs pos="0">
+              <a:schemeClr val="accent3">
+                <a:hueOff val="0"/>
+                <a:satOff val="0"/>
+                <a:lumOff val="0"/>
+                <a:alphaOff val="0"/>
+                <a:tint val="92000"/>
+                <a:shade val="100000"/>
+                <a:satMod val="170000"/>
+              </a:schemeClr>
+            </a:gs>
+            <a:gs pos="15000">
+              <a:schemeClr val="accent3">
+                <a:hueOff val="0"/>
+                <a:satOff val="0"/>
+                <a:lumOff val="0"/>
+                <a:alphaOff val="0"/>
+                <a:tint val="92000"/>
+                <a:shade val="99000"/>
+                <a:satMod val="170000"/>
+              </a:schemeClr>
+            </a:gs>
+            <a:gs pos="62000">
+              <a:schemeClr val="accent3">
+                <a:hueOff val="0"/>
+                <a:satOff val="0"/>
+                <a:lumOff val="0"/>
+                <a:alphaOff val="0"/>
+                <a:tint val="96000"/>
+                <a:shade val="80000"/>
+                <a:satMod val="170000"/>
+              </a:schemeClr>
+            </a:gs>
+            <a:gs pos="97000">
+              <a:schemeClr val="accent3">
+                <a:hueOff val="0"/>
+                <a:satOff val="0"/>
+                <a:lumOff val="0"/>
+                <a:alphaOff val="0"/>
+                <a:tint val="98000"/>
+                <a:shade val="63000"/>
+                <a:satMod val="170000"/>
+              </a:schemeClr>
+            </a:gs>
+            <a:gs pos="100000">
+              <a:schemeClr val="accent3">
+                <a:hueOff val="0"/>
+                <a:satOff val="0"/>
+                <a:lumOff val="0"/>
+                <a:alphaOff val="0"/>
+                <a:shade val="62000"/>
+                <a:satMod val="170000"/>
+              </a:schemeClr>
+            </a:gs>
+          </a:gsLst>
+          <a:path path="circle">
+            <a:fillToRect l="50000" t="50000" r="50000" b="50000"/>
+          </a:path>
+        </a:gradFill>
+        <a:ln>
+          <a:noFill/>
+        </a:ln>
+        <a:effectLst>
+          <a:outerShdw blurRad="63500" dist="25400" dir="5400000" sx="102000" sy="102000" rotWithShape="0">
+            <a:srgbClr val="000000">
+              <a:alpha val="40000"/>
+            </a:srgbClr>
+          </a:outerShdw>
+        </a:effectLst>
+        <a:scene3d>
+          <a:camera prst="orthographicFront">
+            <a:rot lat="0" lon="0" rev="0"/>
+          </a:camera>
+          <a:lightRig rig="glow" dir="tl">
+            <a:rot lat="0" lon="0" rev="6600000"/>
+          </a:lightRig>
+        </a:scene3d>
+        <a:sp3d contourW="12700" prstMaterial="dkEdge">
+          <a:bevelT w="31750" h="19050" prst="softRound"/>
+          <a:contourClr>
+            <a:schemeClr val="accent3">
+              <a:hueOff val="0"/>
+              <a:satOff val="0"/>
+              <a:lumOff val="0"/>
+              <a:alphaOff val="0"/>
+            </a:schemeClr>
+          </a:contourClr>
+        </a:sp3d>
+      </dsp:spPr>
+      <dsp:style>
+        <a:lnRef idx="0">
+          <a:scrgbClr r="0" g="0" b="0"/>
+        </a:lnRef>
+        <a:fillRef idx="3">
+          <a:scrgbClr r="0" g="0" b="0"/>
+        </a:fillRef>
+        <a:effectRef idx="2">
+          <a:scrgbClr r="0" g="0" b="0"/>
+        </a:effectRef>
+        <a:fontRef idx="minor">
+          <a:schemeClr val="lt1"/>
+        </a:fontRef>
+      </dsp:style>
+    </dsp:sp>
+    <dsp:sp modelId="{EC79FAE1-D6F6-4DF4-88A1-80C7E3C9D53D}">
+      <dsp:nvSpPr>
+        <dsp:cNvPr id="0" name=""/>
+        <dsp:cNvSpPr/>
+      </dsp:nvSpPr>
+      <dsp:spPr>
+        <a:xfrm>
+          <a:off x="2939923" y="1679567"/>
+          <a:ext cx="2204471" cy="1399839"/>
+        </a:xfrm>
+        <a:prstGeom prst="roundRect">
+          <a:avLst>
+            <a:gd name="adj" fmla="val 10000"/>
+          </a:avLst>
+        </a:prstGeom>
+        <a:solidFill>
+          <a:schemeClr val="lt1">
+            <a:alpha val="90000"/>
+            <a:hueOff val="0"/>
+            <a:satOff val="0"/>
+            <a:lumOff val="0"/>
+            <a:alphaOff val="0"/>
+          </a:schemeClr>
+        </a:solidFill>
+        <a:ln w="9525" cap="flat" cmpd="sng" algn="ctr">
+          <a:solidFill>
+            <a:schemeClr val="accent3">
+              <a:hueOff val="0"/>
+              <a:satOff val="0"/>
+              <a:lumOff val="0"/>
+              <a:alphaOff val="0"/>
+            </a:schemeClr>
+          </a:solidFill>
+          <a:prstDash val="solid"/>
+        </a:ln>
+        <a:effectLst/>
+      </dsp:spPr>
+      <dsp:style>
+        <a:lnRef idx="1">
+          <a:scrgbClr r="0" g="0" b="0"/>
+        </a:lnRef>
+        <a:fillRef idx="1">
+          <a:scrgbClr r="0" g="0" b="0"/>
+        </a:fillRef>
+        <a:effectRef idx="0">
+          <a:scrgbClr r="0" g="0" b="0"/>
+        </a:effectRef>
+        <a:fontRef idx="minor"/>
+      </dsp:style>
+      <dsp:txBody>
+        <a:bodyPr spcFirstLastPara="0" vert="horz" wrap="square" lIns="102870" tIns="102870" rIns="102870" bIns="102870" numCol="1" spcCol="1270" anchor="ctr" anchorCtr="0">
+          <a:noAutofit/>
+        </a:bodyPr>
+        <a:lstStyle/>
+        <a:p>
+          <a:pPr marL="0" lvl="0" indent="0" algn="ctr" defTabSz="1200150">
+            <a:lnSpc>
+              <a:spcPct val="90000"/>
+            </a:lnSpc>
+            <a:spcBef>
+              <a:spcPct val="0"/>
+            </a:spcBef>
+            <a:spcAft>
+              <a:spcPct val="35000"/>
+            </a:spcAft>
+            <a:buNone/>
+            <a:defRPr cap="all"/>
+          </a:pPr>
+          <a:r>
+            <a:rPr lang="ko-KR" sz="2700" kern="1200"/>
+            <a:t>개발 환경</a:t>
+          </a:r>
+          <a:endParaRPr lang="en-US" sz="2700" kern="1200"/>
+        </a:p>
+      </dsp:txBody>
+      <dsp:txXfrm>
+        <a:off x="2980923" y="1720567"/>
+        <a:ext cx="2122471" cy="1317839"/>
+      </dsp:txXfrm>
+    </dsp:sp>
+  </dsp:spTree>
+</dsp:drawing>
+</file>
+
+<file path=ppt/diagrams/layout1.xml><?xml version="1.0" encoding="utf-8"?>
+<dgm:layoutDef xmlns:dgm="http://schemas.openxmlformats.org/drawingml/2006/diagram" xmlns:a="http://schemas.openxmlformats.org/drawingml/2006/main" uniqueId="urn:microsoft.com/office/officeart/2005/8/layout/hierarchy1">
+  <dgm:title val=""/>
+  <dgm:desc val=""/>
+  <dgm:catLst>
+    <dgm:cat type="hierarchy" pri="2000"/>
+  </dgm:catLst>
+  <dgm:sampData>
+    <dgm:dataModel>
+      <dgm:ptLst>
+        <dgm:pt modelId="0" type="doc"/>
+        <dgm:pt modelId="1">
+          <dgm:prSet phldr="1"/>
+        </dgm:pt>
+        <dgm:pt modelId="2">
+          <dgm:prSet phldr="1"/>
+        </dgm:pt>
+        <dgm:pt modelId="21">
+          <dgm:prSet phldr="1"/>
+        </dgm:pt>
+        <dgm:pt modelId="22">
+          <dgm:prSet phldr="1"/>
+        </dgm:pt>
+        <dgm:pt modelId="3">
+          <dgm:prSet phldr="1"/>
+        </dgm:pt>
+        <dgm:pt modelId="31">
+          <dgm:prSet phldr="1"/>
+        </dgm:pt>
+      </dgm:ptLst>
+      <dgm:cxnLst>
+        <dgm:cxn modelId="4" srcId="0" destId="1" srcOrd="0" destOrd="0"/>
+        <dgm:cxn modelId="5" srcId="1" destId="2" srcOrd="0" destOrd="0"/>
+        <dgm:cxn modelId="6" srcId="1" destId="3" srcOrd="1" destOrd="0"/>
+        <dgm:cxn modelId="23" srcId="2" destId="21" srcOrd="0" destOrd="0"/>
+        <dgm:cxn modelId="24" srcId="2" destId="22" srcOrd="1" destOrd="0"/>
+        <dgm:cxn modelId="33" srcId="3" destId="31" srcOrd="0" destOrd="0"/>
+      </dgm:cxnLst>
+      <dgm:bg/>
+      <dgm:whole/>
+    </dgm:dataModel>
+  </dgm:sampData>
+  <dgm:styleData>
+    <dgm:dataModel>
+      <dgm:ptLst>
+        <dgm:pt modelId="0" type="doc"/>
+        <dgm:pt modelId="1"/>
+        <dgm:pt modelId="11"/>
+        <dgm:pt modelId="12"/>
+      </dgm:ptLst>
+      <dgm:cxnLst>
+        <dgm:cxn modelId="2" srcId="0" destId="1" srcOrd="0" destOrd="0"/>
+        <dgm:cxn modelId="13" srcId="1" destId="11" srcOrd="0" destOrd="0"/>
+        <dgm:cxn modelId="14" srcId="1" destId="12" srcOrd="1" destOrd="0"/>
+      </dgm:cxnLst>
+      <dgm:bg/>
+      <dgm:whole/>
+    </dgm:dataModel>
+  </dgm:styleData>
+  <dgm:clrData>
+    <dgm:dataModel>
+      <dgm:ptLst>
+        <dgm:pt modelId="0" type="doc"/>
+        <dgm:pt modelId="1"/>
+        <dgm:pt modelId="2"/>
+        <dgm:pt modelId="21"/>
+        <dgm:pt modelId="211"/>
+        <dgm:pt modelId="3"/>
+        <dgm:pt modelId="31"/>
+        <dgm:pt modelId="311"/>
+      </dgm:ptLst>
+      <dgm:cxnLst>
+        <dgm:cxn modelId="4" srcId="0" destId="1" srcOrd="0" destOrd="0"/>
+        <dgm:cxn modelId="5" srcId="1" destId="2" srcOrd="0" destOrd="0"/>
+        <dgm:cxn modelId="6" srcId="1" destId="3" srcOrd="1" destOrd="0"/>
+        <dgm:cxn modelId="23" srcId="2" destId="21" srcOrd="0" destOrd="0"/>
+        <dgm:cxn modelId="24" srcId="21" destId="211" srcOrd="0" destOrd="0"/>
+        <dgm:cxn modelId="33" srcId="3" destId="31" srcOrd="0" destOrd="0"/>
+        <dgm:cxn modelId="34" srcId="31" destId="311" srcOrd="0" destOrd="0"/>
+      </dgm:cxnLst>
+      <dgm:bg/>
+      <dgm:whole/>
+    </dgm:dataModel>
+  </dgm:clrData>
+  <dgm:layoutNode name="hierChild1">
+    <dgm:varLst>
+      <dgm:chPref val="1"/>
+      <dgm:dir/>
+      <dgm:animOne val="branch"/>
+      <dgm:animLvl val="lvl"/>
+      <dgm:resizeHandles/>
+    </dgm:varLst>
+    <dgm:choose name="Name0">
+      <dgm:if name="Name1" func="var" arg="dir" op="equ" val="norm">
+        <dgm:alg type="hierChild">
+          <dgm:param type="linDir" val="fromL"/>
+        </dgm:alg>
+      </dgm:if>
+      <dgm:else name="Name2">
+        <dgm:alg type="hierChild">
+          <dgm:param type="linDir" val="fromR"/>
+        </dgm:alg>
+      </dgm:else>
+    </dgm:choose>
+    <dgm:shape xmlns:r="http://schemas.openxmlformats.org/officeDocument/2006/relationships" r:blip="">
+      <dgm:adjLst/>
+    </dgm:shape>
+    <dgm:presOf/>
+    <dgm:constrLst>
+      <dgm:constr type="primFontSz" for="des" ptType="node" op="equ" val="65"/>
+      <dgm:constr type="w" for="des" forName="composite" refType="w"/>
+      <dgm:constr type="h" for="des" forName="composite" refType="w" refFor="des" refForName="composite" fact="0.667"/>
+      <dgm:constr type="w" for="des" forName="composite2" refType="w" refFor="des" refForName="composite"/>
+      <dgm:constr type="h" for="des" forName="composite2" refType="h" refFor="des" refForName="composite"/>
+      <dgm:constr type="w" for="des" forName="composite3" refType="w" refFor="des" refForName="composite"/>
+      <dgm:constr type="h" for="des" forName="composite3" refType="h" refFor="des" refForName="composite"/>
+      <dgm:constr type="w" for="des" forName="composite4" refType="w" refFor="des" refForName="composite"/>
+      <dgm:constr type="h" for="des" forName="composite4" refType="h" refFor="des" refForName="composite"/>
+      <dgm:constr type="w" for="des" forName="composite5" refType="w" refFor="des" refForName="composite"/>
+      <dgm:constr type="h" for="des" forName="composite5" refType="h" refFor="des" refForName="composite"/>
+      <dgm:constr type="sibSp" refType="w" refFor="des" refForName="composite" fact="0.1"/>
+      <dgm:constr type="sibSp" for="des" forName="hierChild2" refType="sibSp"/>
+      <dgm:constr type="sibSp" for="des" forName="hierChild3" refType="sibSp"/>
+      <dgm:constr type="sibSp" for="des" forName="hierChild4" refType="sibSp"/>
+      <dgm:constr type="sibSp" for="des" forName="hierChild5" refType="sibSp"/>
+      <dgm:constr type="sibSp" for="des" forName="hierChild6" refType="sibSp"/>
+      <dgm:constr type="sp" for="des" forName="hierRoot1" refType="h" refFor="des" refForName="composite" fact="0.25"/>
+      <dgm:constr type="sp" for="des" forName="hierRoot2" refType="sp" refFor="des" refForName="hierRoot1"/>
+      <dgm:constr type="sp" for="des" forName="hierRoot3" refType="sp" refFor="des" refForName="hierRoot1"/>
+      <dgm:constr type="sp" for="des" forName="hierRoot4" refType="sp" refFor="des" refForName="hierRoot1"/>
+      <dgm:constr type="sp" for="des" forName="hierRoot5" refType="sp" refFor="des" refForName="hierRoot1"/>
+    </dgm:constrLst>
+    <dgm:ruleLst/>
+    <dgm:forEach name="Name3" axis="ch">
+      <dgm:forEach name="Name4" axis="self" ptType="node">
+        <dgm:layoutNode name="hierRoot1">
+          <dgm:alg type="hierRoot"/>
+          <dgm:shape xmlns:r="http://schemas.openxmlformats.org/officeDocument/2006/relationships" r:blip="">
+            <dgm:adjLst/>
+          </dgm:shape>
+          <dgm:presOf/>
+          <dgm:constrLst>
+            <dgm:constr type="bendDist" for="des" ptType="parTrans" refType="sp" fact="0.5"/>
+          </dgm:constrLst>
+          <dgm:ruleLst/>
+          <dgm:layoutNode name="composite">
+            <dgm:alg type="composite"/>
+            <dgm:shape xmlns:r="http://schemas.openxmlformats.org/officeDocument/2006/relationships" r:blip="">
+              <dgm:adjLst/>
+            </dgm:shape>
+            <dgm:presOf/>
+            <dgm:constrLst>
+              <dgm:constr type="w" for="ch" forName="background" refType="w" fact="0.9"/>
+              <dgm:constr type="h" for="ch" forName="background" refType="w" refFor="ch" refForName="background" fact="0.635"/>
+              <dgm:constr type="t" for="ch" forName="background"/>
+              <dgm:constr type="l" for="ch" forName="background"/>
+              <dgm:constr type="w" for="ch" forName="text" refType="w" fact="0.9"/>
+              <dgm:constr type="h" for="ch" forName="text" refType="w" refFor="ch" refForName="text" fact="0.635"/>
+              <dgm:constr type="t" for="ch" forName="text" refType="w" fact="0.095"/>
+              <dgm:constr type="l" for="ch" forName="text" refType="w" fact="0.1"/>
+            </dgm:constrLst>
+            <dgm:ruleLst/>
+            <dgm:layoutNode name="background" styleLbl="node0" moveWith="text">
+              <dgm:alg type="sp"/>
+              <dgm:shape xmlns:r="http://schemas.openxmlformats.org/officeDocument/2006/relationships" type="roundRect" r:blip="">
+                <dgm:adjLst>
+                  <dgm:adj idx="1" val="0.1"/>
+                </dgm:adjLst>
+              </dgm:shape>
+              <dgm:presOf/>
+              <dgm:constrLst/>
+              <dgm:ruleLst/>
+            </dgm:layoutNode>
+            <dgm:layoutNode name="text" styleLbl="fgAcc0">
+              <dgm:varLst>
+                <dgm:chPref val="3"/>
+              </dgm:varLst>
+              <dgm:alg type="tx"/>
+              <dgm:shape xmlns:r="http://schemas.openxmlformats.org/officeDocument/2006/relationships" type="roundRect" r:blip="">
+                <dgm:adjLst>
+                  <dgm:adj idx="1" val="0.1"/>
+                </dgm:adjLst>
+              </dgm:shape>
+              <dgm:presOf axis="self"/>
+              <dgm:constrLst>
+                <dgm:constr type="tMarg" refType="primFontSz" fact="0.3"/>
+                <dgm:constr type="bMarg" refType="primFontSz" fact="0.3"/>
+                <dgm:constr type="lMarg" refType="primFontSz" fact="0.3"/>
+                <dgm:constr type="rMarg" refType="primFontSz" fact="0.3"/>
+              </dgm:constrLst>
+              <dgm:ruleLst>
+                <dgm:rule type="primFontSz" val="5" fact="NaN" max="NaN"/>
+              </dgm:ruleLst>
+            </dgm:layoutNode>
+          </dgm:layoutNode>
+          <dgm:layoutNode name="hierChild2">
+            <dgm:choose name="Name5">
+              <dgm:if name="Name6" func="var" arg="dir" op="equ" val="norm">
+                <dgm:alg type="hierChild">
+                  <dgm:param type="linDir" val="fromL"/>
+                </dgm:alg>
+              </dgm:if>
+              <dgm:else name="Name7">
+                <dgm:alg type="hierChild">
+                  <dgm:param type="linDir" val="fromR"/>
+                </dgm:alg>
+              </dgm:else>
+            </dgm:choose>
+            <dgm:shape xmlns:r="http://schemas.openxmlformats.org/officeDocument/2006/relationships" r:blip="">
+              <dgm:adjLst/>
+            </dgm:shape>
+            <dgm:presOf/>
+            <dgm:constrLst/>
+            <dgm:ruleLst/>
+            <dgm:forEach name="Name8" axis="ch">
+              <dgm:forEach name="Name9" axis="self" ptType="parTrans" cnt="1">
+                <dgm:layoutNode name="Name10">
+                  <dgm:alg type="conn">
+                    <dgm:param type="dim" val="1D"/>
+                    <dgm:param type="endSty" val="noArr"/>
+                    <dgm:param type="connRout" val="bend"/>
+                    <dgm:param type="bendPt" val="end"/>
+                    <dgm:param type="begPts" val="bCtr"/>
+                    <dgm:param type="endPts" val="tCtr"/>
+                    <dgm:param type="srcNode" val="background"/>
+                    <dgm:param type="dstNode" val="background2"/>
+                  </dgm:alg>
+                  <dgm:shape xmlns:r="http://schemas.openxmlformats.org/officeDocument/2006/relationships" type="conn" r:blip="" zOrderOff="-999">
+                    <dgm:adjLst/>
+                  </dgm:shape>
+                  <dgm:presOf axis="self"/>
+                  <dgm:constrLst>
+                    <dgm:constr type="begPad"/>
+                    <dgm:constr type="endPad"/>
+                  </dgm:constrLst>
+                  <dgm:ruleLst/>
+                </dgm:layoutNode>
+              </dgm:forEach>
+              <dgm:forEach name="Name11" axis="self" ptType="node">
+                <dgm:layoutNode name="hierRoot2">
+                  <dgm:alg type="hierRoot"/>
+                  <dgm:shape xmlns:r="http://schemas.openxmlformats.org/officeDocument/2006/relationships" r:blip="">
+                    <dgm:adjLst/>
+                  </dgm:shape>
+                  <dgm:presOf/>
+                  <dgm:constrLst>
+                    <dgm:constr type="bendDist" for="des" ptType="parTrans" refType="sp" fact="0.5"/>
+                  </dgm:constrLst>
+                  <dgm:ruleLst/>
+                  <dgm:layoutNode name="composite2">
+                    <dgm:alg type="composite"/>
+                    <dgm:shape xmlns:r="http://schemas.openxmlformats.org/officeDocument/2006/relationships" r:blip="">
+                      <dgm:adjLst/>
+                    </dgm:shape>
+                    <dgm:presOf/>
+                    <dgm:constrLst>
+                      <dgm:constr type="w" for="ch" forName="background2" refType="w" fact="0.9"/>
+                      <dgm:constr type="h" for="ch" forName="background2" refType="w" refFor="ch" refForName="background2" fact="0.635"/>
+                      <dgm:constr type="t" for="ch" forName="background2"/>
+                      <dgm:constr type="l" for="ch" forName="background2"/>
+                      <dgm:constr type="w" for="ch" forName="text2" refType="w" fact="0.9"/>
+                      <dgm:constr type="h" for="ch" forName="text2" refType="w" refFor="ch" refForName="text2" fact="0.635"/>
+                      <dgm:constr type="t" for="ch" forName="text2" refType="w" fact="0.095"/>
+                      <dgm:constr type="l" for="ch" forName="text2" refType="w" fact="0.1"/>
+                    </dgm:constrLst>
+                    <dgm:ruleLst/>
+                    <dgm:layoutNode name="background2" moveWith="text2">
+                      <dgm:alg type="sp"/>
+                      <dgm:shape xmlns:r="http://schemas.openxmlformats.org/officeDocument/2006/relationships" type="roundRect" r:blip="">
+                        <dgm:adjLst>
+                          <dgm:adj idx="1" val="0.1"/>
+                        </dgm:adjLst>
+                      </dgm:shape>
+                      <dgm:presOf/>
+                      <dgm:constrLst/>
+                      <dgm:ruleLst/>
+                    </dgm:layoutNode>
+                    <dgm:layoutNode name="text2" styleLbl="fgAcc2">
+                      <dgm:varLst>
+                        <dgm:chPref val="3"/>
+                      </dgm:varLst>
+                      <dgm:alg type="tx"/>
+                      <dgm:shape xmlns:r="http://schemas.openxmlformats.org/officeDocument/2006/relationships" type="roundRect" r:blip="">
+                        <dgm:adjLst>
+                          <dgm:adj idx="1" val="0.1"/>
+                        </dgm:adjLst>
+                      </dgm:shape>
+                      <dgm:presOf axis="self"/>
+                      <dgm:constrLst>
+                        <dgm:constr type="tMarg" refType="primFontSz" fact="0.3"/>
+                        <dgm:constr type="bMarg" refType="primFontSz" fact="0.3"/>
+                        <dgm:constr type="lMarg" refType="primFontSz" fact="0.3"/>
+                        <dgm:constr type="rMarg" refType="primFontSz" fact="0.3"/>
+                      </dgm:constrLst>
+                      <dgm:ruleLst>
+                        <dgm:rule type="primFontSz" val="5" fact="NaN" max="NaN"/>
+                      </dgm:ruleLst>
+                    </dgm:layoutNode>
+                  </dgm:layoutNode>
+                  <dgm:layoutNode name="hierChild3">
+                    <dgm:choose name="Name12">
+                      <dgm:if name="Name13" func="var" arg="dir" op="equ" val="norm">
+                        <dgm:alg type="hierChild">
+                          <dgm:param type="linDir" val="fromL"/>
+                        </dgm:alg>
+                      </dgm:if>
+                      <dgm:else name="Name14">
+                        <dgm:alg type="hierChild">
+                          <dgm:param type="linDir" val="fromR"/>
+                        </dgm:alg>
+                      </dgm:else>
+                    </dgm:choose>
+                    <dgm:shape xmlns:r="http://schemas.openxmlformats.org/officeDocument/2006/relationships" r:blip="">
+                      <dgm:adjLst/>
+                    </dgm:shape>
+                    <dgm:presOf/>
+                    <dgm:constrLst/>
+                    <dgm:ruleLst/>
+                    <dgm:forEach name="Name15" axis="ch">
+                      <dgm:forEach name="Name16" axis="self" ptType="parTrans" cnt="1">
+                        <dgm:layoutNode name="Name17">
+                          <dgm:alg type="conn">
+                            <dgm:param type="dim" val="1D"/>
+                            <dgm:param type="endSty" val="noArr"/>
+                            <dgm:param type="connRout" val="bend"/>
+                            <dgm:param type="bendPt" val="end"/>
+                            <dgm:param type="begPts" val="bCtr"/>
+                            <dgm:param type="endPts" val="tCtr"/>
+                            <dgm:param type="srcNode" val="background2"/>
+                            <dgm:param type="dstNode" val="background3"/>
+                          </dgm:alg>
+                          <dgm:shape xmlns:r="http://schemas.openxmlformats.org/officeDocument/2006/relationships" type="conn" r:blip="" zOrderOff="-999">
+                            <dgm:adjLst/>
+                          </dgm:shape>
+                          <dgm:presOf axis="self"/>
+                          <dgm:constrLst>
+                            <dgm:constr type="begPad"/>
+                            <dgm:constr type="endPad"/>
+                          </dgm:constrLst>
+                          <dgm:ruleLst/>
+                        </dgm:layoutNode>
+                      </dgm:forEach>
+                      <dgm:forEach name="Name18" axis="self" ptType="node">
+                        <dgm:layoutNode name="hierRoot3">
+                          <dgm:alg type="hierRoot"/>
+                          <dgm:shape xmlns:r="http://schemas.openxmlformats.org/officeDocument/2006/relationships" r:blip="">
+                            <dgm:adjLst/>
+                          </dgm:shape>
+                          <dgm:presOf/>
+                          <dgm:constrLst>
+                            <dgm:constr type="bendDist" for="des" ptType="parTrans" refType="sp" fact="0.5"/>
+                          </dgm:constrLst>
+                          <dgm:ruleLst/>
+                          <dgm:layoutNode name="composite3">
+                            <dgm:alg type="composite"/>
+                            <dgm:shape xmlns:r="http://schemas.openxmlformats.org/officeDocument/2006/relationships" r:blip="">
+                              <dgm:adjLst/>
+                            </dgm:shape>
+                            <dgm:presOf/>
+                            <dgm:constrLst>
+                              <dgm:constr type="w" for="ch" forName="background3" refType="w" fact="0.9"/>
+                              <dgm:constr type="h" for="ch" forName="background3" refType="w" refFor="ch" refForName="background3" fact="0.635"/>
+                              <dgm:constr type="t" for="ch" forName="background3"/>
+                              <dgm:constr type="l" for="ch" forName="background3"/>
+                              <dgm:constr type="w" for="ch" forName="text3" refType="w" fact="0.9"/>
+                              <dgm:constr type="h" for="ch" forName="text3" refType="w" refFor="ch" refForName="text3" fact="0.635"/>
+                              <dgm:constr type="t" for="ch" forName="text3" refType="w" fact="0.095"/>
+                              <dgm:constr type="l" for="ch" forName="text3" refType="w" fact="0.1"/>
+                            </dgm:constrLst>
+                            <dgm:ruleLst/>
+                            <dgm:layoutNode name="background3" moveWith="text3">
+                              <dgm:alg type="sp"/>
+                              <dgm:shape xmlns:r="http://schemas.openxmlformats.org/officeDocument/2006/relationships" type="roundRect" r:blip="">
+                                <dgm:adjLst>
+                                  <dgm:adj idx="1" val="0.1"/>
+                                </dgm:adjLst>
+                              </dgm:shape>
+                              <dgm:presOf/>
+                              <dgm:constrLst/>
+                              <dgm:ruleLst/>
+                            </dgm:layoutNode>
+                            <dgm:layoutNode name="text3" styleLbl="fgAcc3">
+                              <dgm:varLst>
+                                <dgm:chPref val="3"/>
+                              </dgm:varLst>
+                              <dgm:alg type="tx"/>
+                              <dgm:shape xmlns:r="http://schemas.openxmlformats.org/officeDocument/2006/relationships" type="roundRect" r:blip="">
+                                <dgm:adjLst>
+                                  <dgm:adj idx="1" val="0.1"/>
+                                </dgm:adjLst>
+                              </dgm:shape>
+                              <dgm:presOf axis="self"/>
+                              <dgm:constrLst>
+                                <dgm:constr type="tMarg" refType="primFontSz" fact="0.3"/>
+                                <dgm:constr type="bMarg" refType="primFontSz" fact="0.3"/>
+                                <dgm:constr type="lMarg" refType="primFontSz" fact="0.3"/>
+                                <dgm:constr type="rMarg" refType="primFontSz" fact="0.3"/>
+                              </dgm:constrLst>
+                              <dgm:ruleLst>
+                                <dgm:rule type="primFontSz" val="5" fact="NaN" max="NaN"/>
+                              </dgm:ruleLst>
+                            </dgm:layoutNode>
+                          </dgm:layoutNode>
+                          <dgm:layoutNode name="hierChild4">
+                            <dgm:choose name="Name19">
+                              <dgm:if name="Name20" func="var" arg="dir" op="equ" val="norm">
+                                <dgm:alg type="hierChild">
+                                  <dgm:param type="linDir" val="fromL"/>
+                                </dgm:alg>
+                              </dgm:if>
+                              <dgm:else name="Name21">
+                                <dgm:alg type="hierChild">
+                                  <dgm:param type="linDir" val="fromR"/>
+                                </dgm:alg>
+                              </dgm:else>
+                            </dgm:choose>
+                            <dgm:shape xmlns:r="http://schemas.openxmlformats.org/officeDocument/2006/relationships" r:blip="">
+                              <dgm:adjLst/>
+                            </dgm:shape>
+                            <dgm:presOf/>
+                            <dgm:constrLst/>
+                            <dgm:ruleLst/>
+                            <dgm:forEach name="repeat" axis="ch">
+                              <dgm:forEach name="Name22" axis="self" ptType="parTrans" cnt="1">
+                                <dgm:layoutNode name="Name23">
+                                  <dgm:choose name="Name24">
+                                    <dgm:if name="Name25" axis="self" func="depth" op="lte" val="4">
+                                      <dgm:alg type="conn">
+                                        <dgm:param type="dim" val="1D"/>
+                                        <dgm:param type="endSty" val="noArr"/>
+                                        <dgm:param type="connRout" val="bend"/>
+                                        <dgm:param type="bendPt" val="end"/>
+                                        <dgm:param type="begPts" val="bCtr"/>
+                                        <dgm:param type="endPts" val="tCtr"/>
+                                        <dgm:param type="srcNode" val="background3"/>
+                                        <dgm:param type="dstNode" val="background4"/>
+                                      </dgm:alg>
+                                    </dgm:if>
+                                    <dgm:else name="Name26">
+                                      <dgm:alg type="conn">
+                                        <dgm:param type="dim" val="1D"/>
+                                        <dgm:param type="endSty" val="noArr"/>
+                                        <dgm:param type="connRout" val="bend"/>
+                                        <dgm:param type="bendPt" val="end"/>
+                                        <dgm:param type="begPts" val="bCtr"/>
+                                        <dgm:param type="endPts" val="tCtr"/>
+                                        <dgm:param type="srcNode" val="background4"/>
+                                        <dgm:param type="dstNode" val="background4"/>
+                                      </dgm:alg>
+                                    </dgm:else>
+                                  </dgm:choose>
+                                  <dgm:shape xmlns:r="http://schemas.openxmlformats.org/officeDocument/2006/relationships" type="conn" r:blip="" zOrderOff="-999">
+                                    <dgm:adjLst/>
+                                  </dgm:shape>
+                                  <dgm:presOf axis="self"/>
+                                  <dgm:constrLst>
+                                    <dgm:constr type="begPad"/>
+                                    <dgm:constr type="endPad"/>
+                                  </dgm:constrLst>
+                                  <dgm:ruleLst/>
+                                </dgm:layoutNode>
+                              </dgm:forEach>
+                              <dgm:forEach name="Name27" axis="self" ptType="node">
+                                <dgm:layoutNode name="hierRoot4">
+                                  <dgm:alg type="hierRoot"/>
+                                  <dgm:shape xmlns:r="http://schemas.openxmlformats.org/officeDocument/2006/relationships" r:blip="">
+                                    <dgm:adjLst/>
+                                  </dgm:shape>
+                                  <dgm:presOf/>
+                                  <dgm:constrLst>
+                                    <dgm:constr type="bendDist" for="des" ptType="parTrans" refType="sp" fact="0.5"/>
+                                  </dgm:constrLst>
+                                  <dgm:ruleLst/>
+                                  <dgm:layoutNode name="composite4">
+                                    <dgm:alg type="composite"/>
+                                    <dgm:shape xmlns:r="http://schemas.openxmlformats.org/officeDocument/2006/relationships" r:blip="">
+                                      <dgm:adjLst/>
+                                    </dgm:shape>
+                                    <dgm:presOf/>
+                                    <dgm:constrLst>
+                                      <dgm:constr type="w" for="ch" forName="background4" refType="w" fact="0.9"/>
+                                      <dgm:constr type="h" for="ch" forName="background4" refType="w" refFor="ch" refForName="background4" fact="0.635"/>
+                                      <dgm:constr type="t" for="ch" forName="background4"/>
+                                      <dgm:constr type="l" for="ch" forName="background4"/>
+                                      <dgm:constr type="w" for="ch" forName="text4" refType="w" fact="0.9"/>
+                                      <dgm:constr type="h" for="ch" forName="text4" refType="w" refFor="ch" refForName="text4" fact="0.635"/>
+                                      <dgm:constr type="t" for="ch" forName="text4" refType="w" fact="0.095"/>
+                                      <dgm:constr type="l" for="ch" forName="text4" refType="w" fact="0.1"/>
+                                    </dgm:constrLst>
+                                    <dgm:ruleLst/>
+                                    <dgm:layoutNode name="background4" moveWith="text4">
+                                      <dgm:alg type="sp"/>
+                                      <dgm:shape xmlns:r="http://schemas.openxmlformats.org/officeDocument/2006/relationships" type="roundRect" r:blip="">
+                                        <dgm:adjLst>
+                                          <dgm:adj idx="1" val="0.1"/>
+                                        </dgm:adjLst>
+                                      </dgm:shape>
+                                      <dgm:presOf/>
+                                      <dgm:constrLst/>
+                                      <dgm:ruleLst/>
+                                    </dgm:layoutNode>
+                                    <dgm:layoutNode name="text4" styleLbl="fgAcc4">
+                                      <dgm:varLst>
+                                        <dgm:chPref val="3"/>
+                                      </dgm:varLst>
+                                      <dgm:alg type="tx"/>
+                                      <dgm:shape xmlns:r="http://schemas.openxmlformats.org/officeDocument/2006/relationships" type="roundRect" r:blip="">
+                                        <dgm:adjLst>
+                                          <dgm:adj idx="1" val="0.1"/>
+                                        </dgm:adjLst>
+                                      </dgm:shape>
+                                      <dgm:presOf axis="self"/>
+                                      <dgm:constrLst>
+                                        <dgm:constr type="tMarg" refType="primFontSz" fact="0.3"/>
+                                        <dgm:constr type="bMarg" refType="primFontSz" fact="0.3"/>
+                                        <dgm:constr type="lMarg" refType="primFontSz" fact="0.3"/>
+                                        <dgm:constr type="rMarg" refType="primFontSz" fact="0.3"/>
+                                      </dgm:constrLst>
+                                      <dgm:ruleLst>
+                                        <dgm:rule type="primFontSz" val="5" fact="NaN" max="NaN"/>
+                                      </dgm:ruleLst>
+                                    </dgm:layoutNode>
+                                  </dgm:layoutNode>
+                                  <dgm:layoutNode name="hierChild5">
+                                    <dgm:choose name="Name28">
+                                      <dgm:if name="Name29" func="var" arg="dir" op="equ" val="norm">
+                                        <dgm:alg type="hierChild">
+                                          <dgm:param type="linDir" val="fromL"/>
+                                        </dgm:alg>
+                                      </dgm:if>
+                                      <dgm:else name="Name30">
+                                        <dgm:alg type="hierChild">
+                                          <dgm:param type="linDir" val="fromR"/>
+                                        </dgm:alg>
+                                      </dgm:else>
+                                    </dgm:choose>
+                                    <dgm:shape xmlns:r="http://schemas.openxmlformats.org/officeDocument/2006/relationships" r:blip="">
+                                      <dgm:adjLst/>
+                                    </dgm:shape>
+                                    <dgm:presOf/>
+                                    <dgm:constrLst/>
+                                    <dgm:ruleLst/>
+                                    <dgm:forEach name="Name31" ref="repeat"/>
+                                  </dgm:layoutNode>
+                                </dgm:layoutNode>
+                              </dgm:forEach>
+                            </dgm:forEach>
+                          </dgm:layoutNode>
+                        </dgm:layoutNode>
+                      </dgm:forEach>
+                    </dgm:forEach>
+                  </dgm:layoutNode>
+                </dgm:layoutNode>
+              </dgm:forEach>
+            </dgm:forEach>
+          </dgm:layoutNode>
+        </dgm:layoutNode>
+      </dgm:forEach>
+    </dgm:forEach>
+  </dgm:layoutNode>
+</dgm:layoutDef>
+</file>
+
+<file path=ppt/diagrams/quickStyle1.xml><?xml version="1.0" encoding="utf-8"?>
+<dgm:styleDef xmlns:dgm="http://schemas.openxmlformats.org/drawingml/2006/diagram" xmlns:a="http://schemas.openxmlformats.org/drawingml/2006/main" uniqueId="urn:microsoft.com/office/officeart/2005/8/quickstyle/simple4">
+  <dgm:title val=""/>
+  <dgm:desc val=""/>
+  <dgm:catLst>
+    <dgm:cat type="simple" pri="10400"/>
+  </dgm:catLst>
+  <dgm:scene3d>
+    <a:camera prst="orthographicFront"/>
+    <a:lightRig rig="threePt" dir="t"/>
+  </dgm:scene3d>
+  <dgm:styleLbl name="node0">
+    <dgm:scene3d>
+      <a:camera prst="orthographicFront"/>
+      <a:lightRig rig="threePt" dir="t"/>
+    </dgm:scene3d>
+    <dgm:sp3d/>
+    <dgm:txPr/>
+    <dgm:style>
+      <a:lnRef idx="0">
+        <a:scrgbClr r="0" g="0" b="0"/>
+      </a:lnRef>
+      <a:fillRef idx="3">
+        <a:scrgbClr r="0" g="0" b="0"/>
+      </a:fillRef>
+      <a:effectRef idx="2">
+        <a:scrgbClr r="0" g="0" b="0"/>
+      </a:effectRef>
+      <a:fontRef idx="minor">
+        <a:schemeClr val="lt1"/>
+      </a:fontRef>
+    </dgm:style>
+  </dgm:styleLbl>
+  <dgm:styleLbl name="lnNode1">
+    <dgm:scene3d>
+      <a:camera prst="orthographicFront"/>
+      <a:lightRig rig="threePt" dir="t"/>
+    </dgm:scene3d>
+    <dgm:sp3d/>
+    <dgm:txPr/>
+    <dgm:style>
+      <a:lnRef idx="1">
+        <a:scrgbClr r="0" g="0" b="0"/>
+      </a:lnRef>
+      <a:fillRef idx="3">
+        <a:scrgbClr r="0" g="0" b="0"/>
+      </a:fillRef>
+      <a:effectRef idx="2">
+        <a:scrgbClr r="0" g="0" b="0"/>
+      </a:effectRef>
+      <a:fontRef idx="minor">
+        <a:schemeClr val="lt1"/>
+      </a:fontRef>
+    </dgm:style>
+  </dgm:styleLbl>
+  <dgm:styleLbl name="vennNode1">
+    <dgm:scene3d>
+      <a:camera prst="orthographicFront"/>
+      <a:lightRig rig="threePt" dir="t"/>
+    </dgm:scene3d>
+    <dgm:sp3d/>
+    <dgm:txPr/>
+    <dgm:style>
+      <a:lnRef idx="0">
+        <a:scrgbClr r="0" g="0" b="0"/>
+      </a:lnRef>
+      <a:fillRef idx="3">
+        <a:scrgbClr r="0" g="0" b="0"/>
+      </a:fillRef>
+      <a:effectRef idx="0">
+        <a:scrgbClr r="0" g="0" b="0"/>
+      </a:effectRef>
+      <a:fontRef idx="minor">
+        <a:schemeClr val="tx1"/>
+      </a:fontRef>
+    </dgm:style>
+  </dgm:styleLbl>
+  <dgm:styleLbl name="alignNode1">
+    <dgm:scene3d>
+      <a:camera prst="orthographicFront"/>
+      <a:lightRig rig="threePt" dir="t"/>
+    </dgm:scene3d>
+    <dgm:sp3d/>
+    <dgm:txPr/>
+    <dgm:style>
+      <a:lnRef idx="1">
+        <a:scrgbClr r="0" g="0" b="0"/>
+      </a:lnRef>
+      <a:fillRef idx="3">
+        <a:scrgbClr r="0" g="0" b="0"/>
+      </a:fillRef>
+      <a:effectRef idx="2">
+        <a:scrgbClr r="0" g="0" b="0"/>
+      </a:effectRef>
+      <a:fontRef idx="minor">
+        <a:schemeClr val="lt1"/>
+      </a:fontRef>
+    </dgm:style>
+  </dgm:styleLbl>
+  <dgm:styleLbl name="node1">
+    <dgm:scene3d>
+      <a:camera prst="orthographicFront"/>
+      <a:lightRig rig="threePt" dir="t"/>
+    </dgm:scene3d>
+    <dgm:sp3d/>
+    <dgm:txPr/>
+    <dgm:style>
+      <a:lnRef idx="0">
+        <a:scrgbClr r="0" g="0" b="0"/>
+      </a:lnRef>
+      <a:fillRef idx="3">
+        <a:scrgbClr r="0" g="0" b="0"/>
+      </a:fillRef>
+      <a:effectRef idx="2">
+        <a:scrgbClr r="0" g="0" b="0"/>
+      </a:effectRef>
+      <a:fontRef idx="minor">
+        <a:schemeClr val="lt1"/>
+      </a:fontRef>
+    </dgm:style>
+  </dgm:styleLbl>
+  <dgm:styleLbl name="node2">
+    <dgm:scene3d>
+      <a:camera prst="orthographicFront"/>
+      <a:lightRig rig="threePt" dir="t"/>
+    </dgm:scene3d>
+    <dgm:sp3d/>
+    <dgm:txPr/>
+    <dgm:style>
+      <a:lnRef idx="0">
+        <a:scrgbClr r="0" g="0" b="0"/>
+      </a:lnRef>
+      <a:fillRef idx="3">
+        <a:scrgbClr r="0" g="0" b="0"/>
+      </a:fillRef>
+      <a:effectRef idx="2">
+        <a:scrgbClr r="0" g="0" b="0"/>
+      </a:effectRef>
+      <a:fontRef idx="minor">
+        <a:schemeClr val="lt1"/>
+      </a:fontRef>
+    </dgm:style>
+  </dgm:styleLbl>
+  <dgm:styleLbl name="node3">
+    <dgm:scene3d>
+      <a:camera prst="orthographicFront"/>
+      <a:lightRig rig="threePt" dir="t"/>
+    </dgm:scene3d>
+    <dgm:sp3d/>
+    <dgm:txPr/>
+    <dgm:style>
+      <a:lnRef idx="0">
+        <a:scrgbClr r="0" g="0" b="0"/>
+      </a:lnRef>
+      <a:fillRef idx="3">
+        <a:scrgbClr r="0" g="0" b="0"/>
+      </a:fillRef>
+      <a:effectRef idx="2">
+        <a:scrgbClr r="0" g="0" b="0"/>
+      </a:effectRef>
+      <a:fontRef idx="minor">
+        <a:schemeClr val="lt1"/>
+      </a:fontRef>
+    </dgm:style>
+  </dgm:styleLbl>
+  <dgm:styleLbl name="node4">
+    <dgm:scene3d>
+      <a:camera prst="orthographicFront"/>
+      <a:lightRig rig="threePt" dir="t"/>
+    </dgm:scene3d>
+    <dgm:sp3d/>
+    <dgm:txPr/>
+    <dgm:style>
+      <a:lnRef idx="0">
+        <a:scrgbClr r="0" g="0" b="0"/>
+      </a:lnRef>
+      <a:fillRef idx="3">
+        <a:scrgbClr r="0" g="0" b="0"/>
+      </a:fillRef>
+      <a:effectRef idx="2">
+        <a:scrgbClr r="0" g="0" b="0"/>
+      </a:effectRef>
+      <a:fontRef idx="minor">
+        <a:schemeClr val="lt1"/>
+      </a:fontRef>
+    </dgm:style>
+  </dgm:styleLbl>
+  <dgm:styleLbl name="fgImgPlace1">
+    <dgm:scene3d>
+      <a:camera prst="orthographicFront"/>
+      <a:lightRig rig="threePt" dir="t"/>
+    </dgm:scene3d>
+    <dgm:sp3d/>
+    <dgm:txPr/>
+    <dgm:style>
+      <a:lnRef idx="0">
+        <a:scrgbClr r="0" g="0" b="0"/>
+      </a:lnRef>
+      <a:fillRef idx="1">
+        <a:scrgbClr r="0" g="0" b="0"/>
+      </a:fillRef>
+      <a:effectRef idx="2">
+        <a:scrgbClr r="0" g="0" b="0"/>
+      </a:effectRef>
+      <a:fontRef idx="minor"/>
+    </dgm:style>
+  </dgm:styleLbl>
+  <dgm:styleLbl name="alignImgPlace1">
+    <dgm:scene3d>
+      <a:camera prst="orthographicFront"/>
+      <a:lightRig rig="threePt" dir="t"/>
+    </dgm:scene3d>
+    <dgm:sp3d/>
+    <dgm:txPr/>
+    <dgm:style>
+      <a:lnRef idx="0">
+        <a:scrgbClr r="0" g="0" b="0"/>
+      </a:lnRef>
+      <a:fillRef idx="1">
+        <a:scrgbClr r="0" g="0" b="0"/>
+      </a:fillRef>
+      <a:effectRef idx="2">
+        <a:scrgbClr r="0" g="0" b="0"/>
+      </a:effectRef>
+      <a:fontRef idx="minor"/>
+    </dgm:style>
+  </dgm:styleLbl>
+  <dgm:styleLbl name="bgImgPlace1">
+    <dgm:scene3d>
+      <a:camera prst="orthographicFront"/>
+      <a:lightRig rig="threePt" dir="t"/>
+    </dgm:scene3d>
+    <dgm:sp3d/>
+    <dgm:txPr/>
+    <dgm:style>
+      <a:lnRef idx="0">
+        <a:scrgbClr r="0" g="0" b="0"/>
+      </a:lnRef>
+      <a:fillRef idx="1">
+        <a:scrgbClr r="0" g="0" b="0"/>
+      </a:fillRef>
+      <a:effectRef idx="2">
+        <a:scrgbClr r="0" g="0" b="0"/>
+      </a:effectRef>
+      <a:fontRef idx="minor"/>
+    </dgm:style>
+  </dgm:styleLbl>
+  <dgm:styleLbl name="sibTrans2D1">
+    <dgm:scene3d>
+      <a:camera prst="orthographicFront"/>
+      <a:lightRig rig="threePt" dir="t"/>
+    </dgm:scene3d>
+    <dgm:sp3d/>
+    <dgm:txPr/>
+    <dgm:style>
+      <a:lnRef idx="0">
+        <a:scrgbClr r="0" g="0" b="0"/>
+      </a:lnRef>
+      <a:fillRef idx="3">
+        <a:scrgbClr r="0" g="0" b="0"/>
+      </a:fillRef>
+      <a:effectRef idx="2">
+        <a:scrgbClr r="0" g="0" b="0"/>
+      </a:effectRef>
+      <a:fontRef idx="minor">
+        <a:schemeClr val="lt1"/>
+      </a:fontRef>
+    </dgm:style>
+  </dgm:styleLbl>
+  <dgm:styleLbl name="fgSibTrans2D1">
+    <dgm:scene3d>
+      <a:camera prst="orthographicFront"/>
+      <a:lightRig rig="threePt" dir="t"/>
+    </dgm:scene3d>
+    <dgm:sp3d/>
+    <dgm:txPr/>
+    <dgm:style>
+      <a:lnRef idx="0">
+        <a:scrgbClr r="0" g="0" b="0"/>
+      </a:lnRef>
+      <a:fillRef idx="3">
+        <a:scrgbClr r="0" g="0" b="0"/>
+      </a:fillRef>
+      <a:effectRef idx="2">
+        <a:scrgbClr r="0" g="0" b="0"/>
+      </a:effectRef>
+      <a:fontRef idx="minor">
+        <a:schemeClr val="lt1"/>
+      </a:fontRef>
+    </dgm:style>
+  </dgm:styleLbl>
+  <dgm:styleLbl name="bgSibTrans2D1">
+    <dgm:scene3d>
+      <a:camera prst="orthographicFront"/>
+      <a:lightRig rig="threePt" dir="t"/>
+    </dgm:scene3d>
+    <dgm:sp3d/>
+    <dgm:txPr/>
+    <dgm:style>
+      <a:lnRef idx="0">
+        <a:scrgbClr r="0" g="0" b="0"/>
+      </a:lnRef>
+      <a:fillRef idx="3">
+        <a:scrgbClr r="0" g="0" b="0"/>
+      </a:fillRef>
+      <a:effectRef idx="2">
+        <a:scrgbClr r="0" g="0" b="0"/>
+      </a:effectRef>
+      <a:fontRef idx="minor">
+        <a:schemeClr val="lt1"/>
+      </a:fontRef>
+    </dgm:style>
+  </dgm:styleLbl>
+  <dgm:styleLbl name="sibTrans1D1">
+    <dgm:scene3d>
+      <a:camera prst="orthographicFront"/>
+      <a:lightRig rig="threePt" dir="t"/>
+    </dgm:scene3d>
+    <dgm:sp3d/>
+    <dgm:txPr/>
+    <dgm:style>
+      <a:lnRef idx="1">
+        <a:scrgbClr r="0" g="0" b="0"/>
+      </a:lnRef>
+      <a:fillRef idx="0">
+        <a:scrgbClr r="0" g="0" b="0"/>
+      </a:fillRef>
+      <a:effectRef idx="0">
+        <a:scrgbClr r="0" g="0" b="0"/>
+      </a:effectRef>
+      <a:fontRef idx="minor"/>
+    </dgm:style>
+  </dgm:styleLbl>
+  <dgm:styleLbl name="callout">
+    <dgm:scene3d>
+      <a:camera prst="orthographicFront"/>
+      <a:lightRig rig="threePt" dir="t"/>
+    </dgm:scene3d>
+    <dgm:sp3d/>
+    <dgm:txPr/>
+    <dgm:style>
+      <a:lnRef idx="2">
+        <a:scrgbClr r="0" g="0" b="0"/>
+      </a:lnRef>
+      <a:fillRef idx="1">
+        <a:scrgbClr r="0" g="0" b="0"/>
+      </a:fillRef>
+      <a:effectRef idx="1">
+        <a:scrgbClr r="0" g="0" b="0"/>
+      </a:effectRef>
+      <a:fontRef idx="minor"/>
+    </dgm:style>
+  </dgm:styleLbl>
+  <dgm:styleLbl name="asst0">
+    <dgm:scene3d>
+      <a:camera prst="orthographicFront"/>
+      <a:lightRig rig="threePt" dir="t"/>
+    </dgm:scene3d>
+    <dgm:sp3d/>
+    <dgm:txPr/>
+    <dgm:style>
+      <a:lnRef idx="0">
+        <a:scrgbClr r="0" g="0" b="0"/>
+      </a:lnRef>
+      <a:fillRef idx="3">
+        <a:scrgbClr r="0" g="0" b="0"/>
+      </a:fillRef>
+      <a:effectRef idx="2">
+        <a:scrgbClr r="0" g="0" b="0"/>
+      </a:effectRef>
+      <a:fontRef idx="minor">
+        <a:schemeClr val="lt1"/>
+      </a:fontRef>
+    </dgm:style>
+  </dgm:styleLbl>
+  <dgm:styleLbl name="asst1">
+    <dgm:scene3d>
+      <a:camera prst="orthographicFront"/>
+      <a:lightRig rig="threePt" dir="t"/>
+    </dgm:scene3d>
+    <dgm:sp3d/>
+    <dgm:txPr/>
+    <dgm:style>
+      <a:lnRef idx="0">
+        <a:scrgbClr r="0" g="0" b="0"/>
+      </a:lnRef>
+      <a:fillRef idx="3">
+        <a:scrgbClr r="0" g="0" b="0"/>
+      </a:fillRef>
+      <a:effectRef idx="2">
+        <a:scrgbClr r="0" g="0" b="0"/>
+      </a:effectRef>
+      <a:fontRef idx="minor">
+        <a:schemeClr val="lt1"/>
+      </a:fontRef>
+    </dgm:style>
+  </dgm:styleLbl>
+  <dgm:styleLbl name="asst2">
+    <dgm:scene3d>
+      <a:camera prst="orthographicFront"/>
+      <a:lightRig rig="threePt" dir="t"/>
+    </dgm:scene3d>
+    <dgm:sp3d/>
+    <dgm:txPr/>
+    <dgm:style>
+      <a:lnRef idx="0">
+        <a:scrgbClr r="0" g="0" b="0"/>
+      </a:lnRef>
+      <a:fillRef idx="3">
+        <a:scrgbClr r="0" g="0" b="0"/>
+      </a:fillRef>
+      <a:effectRef idx="2">
+        <a:scrgbClr r="0" g="0" b="0"/>
+      </a:effectRef>
+      <a:fontRef idx="minor">
+        <a:schemeClr val="lt1"/>
+      </a:fontRef>
+    </dgm:style>
+  </dgm:styleLbl>
+  <dgm:styleLbl name="asst3">
+    <dgm:scene3d>
+      <a:camera prst="orthographicFront"/>
+      <a:lightRig rig="threePt" dir="t"/>
+    </dgm:scene3d>
+    <dgm:sp3d/>
+    <dgm:txPr/>
+    <dgm:style>
+      <a:lnRef idx="0">
+        <a:scrgbClr r="0" g="0" b="0"/>
+      </a:lnRef>
+      <a:fillRef idx="3">
+        <a:scrgbClr r="0" g="0" b="0"/>
+      </a:fillRef>
+      <a:effectRef idx="2">
+        <a:scrgbClr r="0" g="0" b="0"/>
+      </a:effectRef>
+      <a:fontRef idx="minor">
+        <a:schemeClr val="lt1"/>
+      </a:fontRef>
+    </dgm:style>
+  </dgm:styleLbl>
+  <dgm:styleLbl name="asst4">
+    <dgm:scene3d>
+      <a:camera prst="orthographicFront"/>
+      <a:lightRig rig="threePt" dir="t"/>
+    </dgm:scene3d>
+    <dgm:sp3d/>
+    <dgm:txPr/>
+    <dgm:style>
+      <a:lnRef idx="0">
+        <a:scrgbClr r="0" g="0" b="0"/>
+      </a:lnRef>
+      <a:fillRef idx="3">
+        <a:scrgbClr r="0" g="0" b="0"/>
+      </a:fillRef>
+      <a:effectRef idx="2">
+        <a:scrgbClr r="0" g="0" b="0"/>
+      </a:effectRef>
+      <a:fontRef idx="minor">
+        <a:schemeClr val="lt1"/>
+      </a:fontRef>
+    </dgm:style>
+  </dgm:styleLbl>
+  <dgm:styleLbl name="parChTrans2D1">
+    <dgm:scene3d>
+      <a:camera prst="orthographicFront"/>
+      <a:lightRig rig="threePt" dir="t"/>
+    </dgm:scene3d>
+    <dgm:sp3d/>
+    <dgm:txPr/>
+    <dgm:style>
+      <a:lnRef idx="0">
+        <a:scrgbClr r="0" g="0" b="0"/>
+      </a:lnRef>
+      <a:fillRef idx="3">
+        <a:scrgbClr r="0" g="0" b="0"/>
+      </a:fillRef>
+      <a:effectRef idx="2">
+        <a:scrgbClr r="0" g="0" b="0"/>
+      </a:effectRef>
+      <a:fontRef idx="minor">
+        <a:schemeClr val="lt1"/>
+      </a:fontRef>
+    </dgm:style>
+  </dgm:styleLbl>
+  <dgm:styleLbl name="parChTrans2D2">
+    <dgm:scene3d>
+      <a:camera prst="orthographicFront"/>
+      <a:lightRig rig="threePt" dir="t"/>
+    </dgm:scene3d>
+    <dgm:sp3d/>
+    <dgm:txPr/>
+    <dgm:style>
+      <a:lnRef idx="0">
+        <a:scrgbClr r="0" g="0" b="0"/>
+      </a:lnRef>
+      <a:fillRef idx="3">
+        <a:scrgbClr r="0" g="0" b="0"/>
+      </a:fillRef>
+      <a:effectRef idx="2">
+        <a:scrgbClr r="0" g="0" b="0"/>
+      </a:effectRef>
+      <a:fontRef idx="minor">
+        <a:schemeClr val="lt1"/>
+      </a:fontRef>
+    </dgm:style>
+  </dgm:styleLbl>
+  <dgm:styleLbl name="parChTrans2D3">
+    <dgm:scene3d>
+      <a:camera prst="orthographicFront"/>
+      <a:lightRig rig="threePt" dir="t"/>
+    </dgm:scene3d>
+    <dgm:sp3d/>
+    <dgm:txPr/>
+    <dgm:style>
+      <a:lnRef idx="1">
+        <a:scrgbClr r="0" g="0" b="0"/>
+      </a:lnRef>
+      <a:fillRef idx="3">
+        <a:scrgbClr r="0" g="0" b="0"/>
+      </a:fillRef>
+      <a:effectRef idx="2">
+        <a:scrgbClr r="0" g="0" b="0"/>
+      </a:effectRef>
+      <a:fontRef idx="minor">
+        <a:schemeClr val="lt1"/>
+      </a:fontRef>
+    </dgm:style>
+  </dgm:styleLbl>
+  <dgm:styleLbl name="parChTrans2D4">
+    <dgm:scene3d>
+      <a:camera prst="orthographicFront"/>
+      <a:lightRig rig="threePt" dir="t"/>
+    </dgm:scene3d>
+    <dgm:sp3d/>
+    <dgm:txPr/>
+    <dgm:style>
+      <a:lnRef idx="1">
+        <a:scrgbClr r="0" g="0" b="0"/>
+      </a:lnRef>
+      <a:fillRef idx="3">
+        <a:scrgbClr r="0" g="0" b="0"/>
+      </a:fillRef>
+      <a:effectRef idx="2">
+        <a:scrgbClr r="0" g="0" b="0"/>
+      </a:effectRef>
+      <a:fontRef idx="minor">
+        <a:schemeClr val="lt1"/>
+      </a:fontRef>
+    </dgm:style>
+  </dgm:styleLbl>
+  <dgm:styleLbl name="parChTrans1D1">
+    <dgm:scene3d>
+      <a:camera prst="orthographicFront"/>
+      <a:lightRig rig="threePt" dir="t"/>
+    </dgm:scene3d>
+    <dgm:sp3d/>
+    <dgm:txPr/>
+    <dgm:style>
+      <a:lnRef idx="1">
+        <a:scrgbClr r="0" g="0" b="0"/>
+      </a:lnRef>
+      <a:fillRef idx="0">
+        <a:scrgbClr r="0" g="0" b="0"/>
+      </a:fillRef>
+      <a:effectRef idx="0">
+        <a:scrgbClr r="0" g="0" b="0"/>
+      </a:effectRef>
+      <a:fontRef idx="minor"/>
+    </dgm:style>
+  </dgm:styleLbl>
+  <dgm:styleLbl name="parChTrans1D2">
+    <dgm:scene3d>
+      <a:camera prst="orthographicFront"/>
+      <a:lightRig rig="threePt" dir="t"/>
+    </dgm:scene3d>
+    <dgm:sp3d/>
+    <dgm:txPr/>
+    <dgm:style>
+      <a:lnRef idx="1">
+        <a:scrgbClr r="0" g="0" b="0"/>
+      </a:lnRef>
+      <a:fillRef idx="0">
+        <a:scrgbClr r="0" g="0" b="0"/>
+      </a:fillRef>
+      <a:effectRef idx="0">
+        <a:scrgbClr r="0" g="0" b="0"/>
+      </a:effectRef>
+      <a:fontRef idx="minor"/>
+    </dgm:style>
+  </dgm:styleLbl>
+  <dgm:styleLbl name="parChTrans1D3">
+    <dgm:scene3d>
+      <a:camera prst="orthographicFront"/>
+      <a:lightRig rig="threePt" dir="t"/>
+    </dgm:scene3d>
+    <dgm:sp3d/>
+    <dgm:txPr/>
+    <dgm:style>
+      <a:lnRef idx="1">
+        <a:scrgbClr r="0" g="0" b="0"/>
+      </a:lnRef>
+      <a:fillRef idx="0">
+        <a:scrgbClr r="0" g="0" b="0"/>
+      </a:fillRef>
+      <a:effectRef idx="0">
+        <a:scrgbClr r="0" g="0" b="0"/>
+      </a:effectRef>
+      <a:fontRef idx="minor"/>
+    </dgm:style>
+  </dgm:styleLbl>
+  <dgm:styleLbl name="parChTrans1D4">
+    <dgm:scene3d>
+      <a:camera prst="orthographicFront"/>
+      <a:lightRig rig="threePt" dir="t"/>
+    </dgm:scene3d>
+    <dgm:sp3d/>
+    <dgm:txPr/>
+    <dgm:style>
+      <a:lnRef idx="1">
+        <a:scrgbClr r="0" g="0" b="0"/>
+      </a:lnRef>
+      <a:fillRef idx="0">
+        <a:scrgbClr r="0" g="0" b="0"/>
+      </a:fillRef>
+      <a:effectRef idx="0">
+        <a:scrgbClr r="0" g="0" b="0"/>
+      </a:effectRef>
+      <a:fontRef idx="minor"/>
+    </dgm:style>
+  </dgm:styleLbl>
+  <dgm:styleLbl name="fgAcc1">
+    <dgm:scene3d>
+      <a:camera prst="orthographicFront"/>
+      <a:lightRig rig="threePt" dir="t"/>
+    </dgm:scene3d>
+    <dgm:sp3d/>
+    <dgm:txPr/>
+    <dgm:style>
+      <a:lnRef idx="1">
+        <a:scrgbClr r="0" g="0" b="0"/>
+      </a:lnRef>
+      <a:fillRef idx="1">
+        <a:scrgbClr r="0" g="0" b="0"/>
+      </a:fillRef>
+      <a:effectRef idx="0">
+        <a:scrgbClr r="0" g="0" b="0"/>
+      </a:effectRef>
+      <a:fontRef idx="minor"/>
+    </dgm:style>
+  </dgm:styleLbl>
+  <dgm:styleLbl name="conFgAcc1">
+    <dgm:scene3d>
+      <a:camera prst="orthographicFront"/>
+      <a:lightRig rig="threePt" dir="t"/>
+    </dgm:scene3d>
+    <dgm:sp3d/>
+    <dgm:txPr/>
+    <dgm:style>
+      <a:lnRef idx="1">
+        <a:scrgbClr r="0" g="0" b="0"/>
+      </a:lnRef>
+      <a:fillRef idx="1">
+        <a:scrgbClr r="0" g="0" b="0"/>
+      </a:fillRef>
+      <a:effectRef idx="0">
+        <a:scrgbClr r="0" g="0" b="0"/>
+      </a:effectRef>
+      <a:fontRef idx="minor"/>
+    </dgm:style>
+  </dgm:styleLbl>
+  <dgm:styleLbl name="alignAcc1">
+    <dgm:scene3d>
+      <a:camera prst="orthographicFront"/>
+      <a:lightRig rig="threePt" dir="t"/>
+    </dgm:scene3d>
+    <dgm:sp3d/>
+    <dgm:txPr/>
+    <dgm:style>
+      <a:lnRef idx="1">
+        <a:scrgbClr r="0" g="0" b="0"/>
+      </a:lnRef>
+      <a:fillRef idx="1">
+        <a:scrgbClr r="0" g="0" b="0"/>
+      </a:fillRef>
+      <a:effectRef idx="0">
+        <a:scrgbClr r="0" g="0" b="0"/>
+      </a:effectRef>
+      <a:fontRef idx="minor"/>
+    </dgm:style>
+  </dgm:styleLbl>
+  <dgm:styleLbl name="trAlignAcc1">
+    <dgm:scene3d>
+      <a:camera prst="orthographicFront"/>
+      <a:lightRig rig="threePt" dir="t"/>
+    </dgm:scene3d>
+    <dgm:sp3d/>
+    <dgm:txPr/>
+    <dgm:style>
+      <a:lnRef idx="1">
+        <a:scrgbClr r="0" g="0" b="0"/>
+      </a:lnRef>
+      <a:fillRef idx="1">
+        <a:scrgbClr r="0" g="0" b="0"/>
+      </a:fillRef>
+      <a:effectRef idx="0">
+        <a:scrgbClr r="0" g="0" b="0"/>
+      </a:effectRef>
+      <a:fontRef idx="minor"/>
+    </dgm:style>
+  </dgm:styleLbl>
+  <dgm:styleLbl name="bgAcc1">
+    <dgm:scene3d>
+      <a:camera prst="orthographicFront"/>
+      <a:lightRig rig="threePt" dir="t"/>
+    </dgm:scene3d>
+    <dgm:sp3d/>
+    <dgm:txPr/>
+    <dgm:style>
+      <a:lnRef idx="1">
+        <a:scrgbClr r="0" g="0" b="0"/>
+      </a:lnRef>
+      <a:fillRef idx="1">
+        <a:scrgbClr r="0" g="0" b="0"/>
+      </a:fillRef>
+      <a:effectRef idx="0">
+        <a:scrgbClr r="0" g="0" b="0"/>
+      </a:effectRef>
+      <a:fontRef idx="minor"/>
+    </dgm:style>
+  </dgm:styleLbl>
+  <dgm:styleLbl name="solidFgAcc1">
+    <dgm:scene3d>
+      <a:camera prst="orthographicFront"/>
+      <a:lightRig rig="threePt" dir="t"/>
+    </dgm:scene3d>
+    <dgm:sp3d/>
+    <dgm:txPr/>
+    <dgm:style>
+      <a:lnRef idx="1">
+        <a:scrgbClr r="0" g="0" b="0"/>
+      </a:lnRef>
+      <a:fillRef idx="1">
+        <a:scrgbClr r="0" g="0" b="0"/>
+      </a:fillRef>
+      <a:effectRef idx="0">
+        <a:scrgbClr r="0" g="0" b="0"/>
+      </a:effectRef>
+      <a:fontRef idx="minor"/>
+    </dgm:style>
+  </dgm:styleLbl>
+  <dgm:styleLbl name="solidAlignAcc1">
+    <dgm:scene3d>
+      <a:camera prst="orthographicFront"/>
+      <a:lightRig rig="threePt" dir="t"/>
+    </dgm:scene3d>
+    <dgm:sp3d/>
+    <dgm:txPr/>
+    <dgm:style>
+      <a:lnRef idx="1">
+        <a:scrgbClr r="0" g="0" b="0"/>
+      </a:lnRef>
+      <a:fillRef idx="1">
+        <a:scrgbClr r="0" g="0" b="0"/>
+      </a:fillRef>
+      <a:effectRef idx="0">
+        <a:scrgbClr r="0" g="0" b="0"/>
+      </a:effectRef>
+      <a:fontRef idx="minor"/>
+    </dgm:style>
+  </dgm:styleLbl>
+  <dgm:styleLbl name="solidBgAcc1">
+    <dgm:scene3d>
+      <a:camera prst="orthographicFront"/>
+      <a:lightRig rig="threePt" dir="t"/>
+    </dgm:scene3d>
+    <dgm:sp3d/>
+    <dgm:txPr/>
+    <dgm:style>
+      <a:lnRef idx="1">
+        <a:scrgbClr r="0" g="0" b="0"/>
+      </a:lnRef>
+      <a:fillRef idx="1">
+        <a:scrgbClr r="0" g="0" b="0"/>
+      </a:fillRef>
+      <a:effectRef idx="0">
+        <a:scrgbClr r="0" g="0" b="0"/>
+      </a:effectRef>
+      <a:fontRef idx="minor"/>
+    </dgm:style>
+  </dgm:styleLbl>
+  <dgm:styleLbl name="fgAccFollowNode1">
+    <dgm:scene3d>
+      <a:camera prst="orthographicFront"/>
+      <a:lightRig rig="threePt" dir="t"/>
+    </dgm:scene3d>
+    <dgm:sp3d/>
+    <dgm:txPr/>
+    <dgm:style>
+      <a:lnRef idx="1">
+        <a:scrgbClr r="0" g="0" b="0"/>
+      </a:lnRef>
+      <a:fillRef idx="1">
+        <a:scrgbClr r="0" g="0" b="0"/>
+      </a:fillRef>
+      <a:effectRef idx="0">
+        <a:scrgbClr r="0" g="0" b="0"/>
+      </a:effectRef>
+      <a:fontRef idx="minor"/>
+    </dgm:style>
+  </dgm:styleLbl>
+  <dgm:styleLbl name="alignAccFollowNode1">
+    <dgm:scene3d>
+      <a:camera prst="orthographicFront"/>
+      <a:lightRig rig="threePt" dir="t"/>
+    </dgm:scene3d>
+    <dgm:sp3d/>
+    <dgm:txPr/>
+    <dgm:style>
+      <a:lnRef idx="1">
+        <a:scrgbClr r="0" g="0" b="0"/>
+      </a:lnRef>
+      <a:fillRef idx="1">
+        <a:scrgbClr r="0" g="0" b="0"/>
+      </a:fillRef>
+      <a:effectRef idx="0">
+        <a:scrgbClr r="0" g="0" b="0"/>
+      </a:effectRef>
+      <a:fontRef idx="minor"/>
+    </dgm:style>
+  </dgm:styleLbl>
+  <dgm:styleLbl name="bgAccFollowNode1">
+    <dgm:scene3d>
+      <a:camera prst="orthographicFront"/>
+      <a:lightRig rig="threePt" dir="t"/>
+    </dgm:scene3d>
+    <dgm:sp3d/>
+    <dgm:txPr/>
+    <dgm:style>
+      <a:lnRef idx="1">
+        <a:scrgbClr r="0" g="0" b="0"/>
+      </a:lnRef>
+      <a:fillRef idx="1">
+        <a:scrgbClr r="0" g="0" b="0"/>
+      </a:fillRef>
+      <a:effectRef idx="0">
+        <a:scrgbClr r="0" g="0" b="0"/>
+      </a:effectRef>
+      <a:fontRef idx="minor"/>
+    </dgm:style>
+  </dgm:styleLbl>
+  <dgm:styleLbl name="fgAcc0">
+    <dgm:scene3d>
+      <a:camera prst="orthographicFront"/>
+      <a:lightRig rig="threePt" dir="t"/>
+    </dgm:scene3d>
+    <dgm:sp3d/>
+    <dgm:txPr/>
+    <dgm:style>
+      <a:lnRef idx="1">
+        <a:scrgbClr r="0" g="0" b="0"/>
+      </a:lnRef>
+      <a:fillRef idx="1">
+        <a:scrgbClr r="0" g="0" b="0"/>
+      </a:fillRef>
+      <a:effectRef idx="0">
+        <a:scrgbClr r="0" g="0" b="0"/>
+      </a:effectRef>
+      <a:fontRef idx="minor"/>
+    </dgm:style>
+  </dgm:styleLbl>
+  <dgm:styleLbl name="fgAcc2">
+    <dgm:scene3d>
+      <a:camera prst="orthographicFront"/>
+      <a:lightRig rig="threePt" dir="t"/>
+    </dgm:scene3d>
+    <dgm:sp3d/>
+    <dgm:txPr/>
+    <dgm:style>
+      <a:lnRef idx="1">
+        <a:scrgbClr r="0" g="0" b="0"/>
+      </a:lnRef>
+      <a:fillRef idx="1">
+        <a:scrgbClr r="0" g="0" b="0"/>
+      </a:fillRef>
+      <a:effectRef idx="0">
+        <a:scrgbClr r="0" g="0" b="0"/>
+      </a:effectRef>
+      <a:fontRef idx="minor"/>
+    </dgm:style>
+  </dgm:styleLbl>
+  <dgm:styleLbl name="fgAcc3">
+    <dgm:scene3d>
+      <a:camera prst="orthographicFront"/>
+      <a:lightRig rig="threePt" dir="t"/>
+    </dgm:scene3d>
+    <dgm:sp3d/>
+    <dgm:txPr/>
+    <dgm:style>
+      <a:lnRef idx="1">
+        <a:scrgbClr r="0" g="0" b="0"/>
+      </a:lnRef>
+      <a:fillRef idx="1">
+        <a:scrgbClr r="0" g="0" b="0"/>
+      </a:fillRef>
+      <a:effectRef idx="0">
+        <a:scrgbClr r="0" g="0" b="0"/>
+      </a:effectRef>
+      <a:fontRef idx="minor"/>
+    </dgm:style>
+  </dgm:styleLbl>
+  <dgm:styleLbl name="fgAcc4">
+    <dgm:scene3d>
+      <a:camera prst="orthographicFront"/>
+      <a:lightRig rig="threePt" dir="t"/>
+    </dgm:scene3d>
+    <dgm:sp3d/>
+    <dgm:txPr/>
+    <dgm:style>
+      <a:lnRef idx="1">
+        <a:scrgbClr r="0" g="0" b="0"/>
+      </a:lnRef>
+      <a:fillRef idx="1">
+        <a:scrgbClr r="0" g="0" b="0"/>
+      </a:fillRef>
+      <a:effectRef idx="0">
+        <a:scrgbClr r="0" g="0" b="0"/>
+      </a:effectRef>
+      <a:fontRef idx="minor"/>
+    </dgm:style>
+  </dgm:styleLbl>
+  <dgm:styleLbl name="bgShp">
+    <dgm:scene3d>
+      <a:camera prst="orthographicFront"/>
+      <a:lightRig rig="threePt" dir="t"/>
+    </dgm:scene3d>
+    <dgm:sp3d/>
+    <dgm:txPr/>
+    <dgm:style>
+      <a:lnRef idx="0">
+        <a:scrgbClr r="0" g="0" b="0"/>
+      </a:lnRef>
+      <a:fillRef idx="1">
+        <a:scrgbClr r="0" g="0" b="0"/>
+      </a:fillRef>
+      <a:effectRef idx="2">
+        <a:scrgbClr r="0" g="0" b="0"/>
+      </a:effectRef>
+      <a:fontRef idx="minor"/>
+    </dgm:style>
+  </dgm:styleLbl>
+  <dgm:styleLbl name="dkBgShp">
+    <dgm:scene3d>
+      <a:camera prst="orthographicFront"/>
+      <a:lightRig rig="threePt" dir="t"/>
+    </dgm:scene3d>
+    <dgm:sp3d/>
+    <dgm:txPr/>
+    <dgm:style>
+      <a:lnRef idx="0">
+        <a:scrgbClr r="0" g="0" b="0"/>
+      </a:lnRef>
+      <a:fillRef idx="1">
+        <a:scrgbClr r="0" g="0" b="0"/>
+      </a:fillRef>
+      <a:effectRef idx="2">
+        <a:scrgbClr r="0" g="0" b="0"/>
+      </a:effectRef>
+      <a:fontRef idx="minor"/>
+    </dgm:style>
+  </dgm:styleLbl>
+  <dgm:styleLbl name="trBgShp">
+    <dgm:scene3d>
+      <a:camera prst="orthographicFront"/>
+      <a:lightRig rig="threePt" dir="t"/>
+    </dgm:scene3d>
+    <dgm:sp3d/>
+    <dgm:txPr/>
+    <dgm:style>
+      <a:lnRef idx="0">
+        <a:scrgbClr r="0" g="0" b="0"/>
+      </a:lnRef>
+      <a:fillRef idx="1">
+        <a:scrgbClr r="0" g="0" b="0"/>
+      </a:fillRef>
+      <a:effectRef idx="0">
+        <a:scrgbClr r="0" g="0" b="0"/>
+      </a:effectRef>
+      <a:fontRef idx="minor"/>
+    </dgm:style>
+  </dgm:styleLbl>
+  <dgm:styleLbl name="fgShp">
+    <dgm:scene3d>
+      <a:camera prst="orthographicFront"/>
+      <a:lightRig rig="threePt" dir="t"/>
+    </dgm:scene3d>
+    <dgm:sp3d/>
+    <dgm:txPr/>
+    <dgm:style>
+      <a:lnRef idx="0">
+        <a:scrgbClr r="0" g="0" b="0"/>
+      </a:lnRef>
+      <a:fillRef idx="3">
+        <a:scrgbClr r="0" g="0" b="0"/>
+      </a:fillRef>
+      <a:effectRef idx="2">
+        <a:scrgbClr r="0" g="0" b="0"/>
+      </a:effectRef>
+      <a:fontRef idx="minor"/>
+    </dgm:style>
+  </dgm:styleLbl>
+  <dgm:styleLbl name="revTx">
+    <dgm:scene3d>
+      <a:camera prst="orthographicFront"/>
+      <a:lightRig rig="threePt" dir="t"/>
+    </dgm:scene3d>
+    <dgm:sp3d/>
+    <dgm:txPr/>
+    <dgm:style>
+      <a:lnRef idx="0">
+        <a:scrgbClr r="0" g="0" b="0"/>
+      </a:lnRef>
+      <a:fillRef idx="0">
+        <a:scrgbClr r="0" g="0" b="0"/>
+      </a:fillRef>
+      <a:effectRef idx="0">
+        <a:scrgbClr r="0" g="0" b="0"/>
+      </a:effectRef>
+      <a:fontRef idx="minor"/>
+    </dgm:style>
+  </dgm:styleLbl>
+</dgm:styleDef>
 </file>
 
 <file path=ppt/slideLayouts/slideLayout1.xml><?xml version="1.0" encoding="utf-8"?>
@@ -8384,42 +11326,41 @@
           <a:chExt cx="0" cy="0"/>
         </a:xfrm>
       </p:grpSpPr>
-      <p:sp>
-        <p:nvSpPr>
-          <p:cNvPr id="2" name="내용 개체 틀 1">
+      <p:pic>
+        <p:nvPicPr>
+          <p:cNvPr id="6" name="내용 개체 틀 5" descr="사무용품, 노트북, 컴퓨터, 사무 장비이(가) 표시된 사진&#10;&#10;AI 생성 콘텐츠는 정확하지 않을 수 있습니다.">
             <a:extLst>
               <a:ext uri="{FF2B5EF4-FFF2-40B4-BE49-F238E27FC236}">
-                <a16:creationId xmlns:a16="http://schemas.microsoft.com/office/drawing/2014/main" id="{39607E3C-4F8B-E1B3-65E3-B21154644DAC}"/>
+                <a16:creationId xmlns:a16="http://schemas.microsoft.com/office/drawing/2014/main" id="{708A042D-82BC-06C7-D27F-089252F9D326}"/>
               </a:ext>
             </a:extLst>
           </p:cNvPr>
-          <p:cNvSpPr>
-            <a:spLocks noGrp="1"/>
-          </p:cNvSpPr>
+          <p:cNvPicPr>
+            <a:picLocks noGrp="1" noChangeAspect="1"/>
+          </p:cNvPicPr>
           <p:nvPr>
-            <p:ph idx="1"/>
+            <p:ph sz="half" idx="1"/>
           </p:nvPr>
-        </p:nvSpPr>
-        <p:spPr/>
-        <p:txBody>
-          <a:bodyPr/>
-          <a:lstStyle/>
-          <a:p>
-            <a:r>
-              <a:rPr lang="ko-KR" altLang="en-US" dirty="0"/>
-              <a:t>프로젝트 개요</a:t>
-            </a:r>
-            <a:endParaRPr lang="en-US" altLang="ko-KR" dirty="0"/>
-          </a:p>
-          <a:p>
-            <a:r>
-              <a:rPr lang="ko-KR" altLang="en-US"/>
-              <a:t>개발 환경</a:t>
-            </a:r>
-            <a:endParaRPr lang="en-US" altLang="ko-KR" dirty="0"/>
-          </a:p>
-        </p:txBody>
-      </p:sp>
+        </p:nvPicPr>
+        <p:blipFill>
+          <a:blip r:embed="rId2">
+            <a:extLst>
+              <a:ext uri="{28A0092B-C50C-407E-A947-70E740481C1C}">
+                <a14:useLocalDpi xmlns:a14="http://schemas.microsoft.com/office/drawing/2010/main" val="0"/>
+              </a:ext>
+            </a:extLst>
+          </a:blip>
+          <a:stretch>
+            <a:fillRect/>
+          </a:stretch>
+        </p:blipFill>
+        <p:spPr>
+          <a:xfrm>
+            <a:off x="669925" y="2148822"/>
+            <a:ext cx="5145088" cy="3428718"/>
+          </a:xfrm>
+        </p:spPr>
+      </p:pic>
       <p:sp>
         <p:nvSpPr>
           <p:cNvPr id="3" name="제목 2">
@@ -8436,14 +11377,304 @@
             <p:ph type="title"/>
           </p:nvPr>
         </p:nvSpPr>
+        <p:spPr>
+          <a:xfrm>
+            <a:off x="609600" y="152400"/>
+            <a:ext cx="10972800" cy="1143000"/>
+          </a:xfrm>
+        </p:spPr>
+        <p:txBody>
+          <a:bodyPr anchor="ctr">
+            <a:normAutofit/>
+          </a:bodyPr>
+          <a:lstStyle/>
+          <a:p>
+            <a:r>
+              <a:rPr lang="ko-KR" altLang="en-US" dirty="0"/>
+              <a:t>목록</a:t>
+            </a:r>
+          </a:p>
+        </p:txBody>
+      </p:sp>
+      <p:graphicFrame>
+        <p:nvGraphicFramePr>
+          <p:cNvPr id="5" name="내용 개체 틀 1">
+            <a:extLst>
+              <a:ext uri="{FF2B5EF4-FFF2-40B4-BE49-F238E27FC236}">
+                <a16:creationId xmlns:a16="http://schemas.microsoft.com/office/drawing/2014/main" id="{E53CBADA-78CE-FDDA-E795-2E36E0019DDB}"/>
+              </a:ext>
+            </a:extLst>
+          </p:cNvPr>
+          <p:cNvGraphicFramePr>
+            <a:graphicFrameLocks noGrp="1"/>
+          </p:cNvGraphicFramePr>
+          <p:nvPr>
+            <p:ph sz="half" idx="2"/>
+            <p:extLst>
+              <p:ext uri="{D42A27DB-BD31-4B8C-83A1-F6EECF244321}">
+                <p14:modId xmlns:p14="http://schemas.microsoft.com/office/powerpoint/2010/main" val="185964315"/>
+              </p:ext>
+            </p:extLst>
+          </p:nvPr>
+        </p:nvGraphicFramePr>
+        <p:xfrm>
+          <a:off x="5998464" y="1600199"/>
+          <a:ext cx="5145024" cy="4526280"/>
+        </p:xfrm>
+        <a:graphic>
+          <a:graphicData uri="http://schemas.openxmlformats.org/drawingml/2006/diagram">
+            <dgm:relIds xmlns:dgm="http://schemas.openxmlformats.org/drawingml/2006/diagram" xmlns:r="http://schemas.openxmlformats.org/officeDocument/2006/relationships" r:dm="rId3" r:lo="rId4" r:qs="rId5" r:cs="rId6"/>
+          </a:graphicData>
+        </a:graphic>
+      </p:graphicFrame>
+    </p:spTree>
+    <p:extLst>
+      <p:ext uri="{BB962C8B-B14F-4D97-AF65-F5344CB8AC3E}">
+        <p14:creationId xmlns:p14="http://schemas.microsoft.com/office/powerpoint/2010/main" val="555791236"/>
+      </p:ext>
+    </p:extLst>
+  </p:cSld>
+  <p:clrMapOvr>
+    <a:masterClrMapping/>
+  </p:clrMapOvr>
+</p:sld>
+</file>
+
+<file path=ppt/slides/slide3.xml><?xml version="1.0" encoding="utf-8"?>
+<p:sld xmlns:a="http://schemas.openxmlformats.org/drawingml/2006/main" xmlns:r="http://schemas.openxmlformats.org/officeDocument/2006/relationships" xmlns:p="http://schemas.openxmlformats.org/presentationml/2006/main">
+  <p:cSld>
+    <p:spTree>
+      <p:nvGrpSpPr>
+        <p:cNvPr id="1" name=""/>
+        <p:cNvGrpSpPr/>
+        <p:nvPr/>
+      </p:nvGrpSpPr>
+      <p:grpSpPr>
+        <a:xfrm>
+          <a:off x="0" y="0"/>
+          <a:ext cx="0" cy="0"/>
+          <a:chOff x="0" y="0"/>
+          <a:chExt cx="0" cy="0"/>
+        </a:xfrm>
+      </p:grpSpPr>
+      <p:sp>
+        <p:nvSpPr>
+          <p:cNvPr id="2" name="내용 개체 틀 1">
+            <a:extLst>
+              <a:ext uri="{FF2B5EF4-FFF2-40B4-BE49-F238E27FC236}">
+                <a16:creationId xmlns:a16="http://schemas.microsoft.com/office/drawing/2014/main" id="{A03AB34D-5B78-7BF7-2F8F-D8CF061C1BCF}"/>
+              </a:ext>
+            </a:extLst>
+          </p:cNvPr>
+          <p:cNvSpPr>
+            <a:spLocks noGrp="1"/>
+          </p:cNvSpPr>
+          <p:nvPr>
+            <p:ph idx="1"/>
+          </p:nvPr>
+        </p:nvSpPr>
+        <p:spPr>
+          <a:xfrm>
+            <a:off x="689428" y="2332037"/>
+            <a:ext cx="10813143" cy="4525963"/>
+          </a:xfrm>
+        </p:spPr>
+        <p:txBody>
+          <a:bodyPr>
+            <a:normAutofit/>
+          </a:bodyPr>
+          <a:lstStyle/>
+          <a:p>
+            <a:pPr marL="0" indent="0" algn="ctr">
+              <a:buNone/>
+            </a:pPr>
+            <a:r>
+              <a:rPr lang="en-US" altLang="ko-KR" sz="2400" dirty="0"/>
+              <a:t>7</a:t>
+            </a:r>
+            <a:r>
+              <a:rPr lang="ko-KR" altLang="en-US" sz="2400" dirty="0"/>
+              <a:t>월 초</a:t>
+            </a:r>
+            <a:r>
+              <a:rPr lang="en-US" altLang="ko-KR" sz="2400" dirty="0"/>
+              <a:t>, </a:t>
+            </a:r>
+            <a:r>
+              <a:rPr lang="ko-KR" altLang="en-US" sz="2400" dirty="0"/>
+              <a:t>저는 </a:t>
+            </a:r>
+            <a:r>
+              <a:rPr lang="en-US" altLang="ko-KR" sz="2400" dirty="0"/>
+              <a:t>IT </a:t>
+            </a:r>
+            <a:r>
+              <a:rPr lang="ko-KR" altLang="en-US" sz="2400" dirty="0"/>
+              <a:t>학원을 다니면서 </a:t>
+            </a:r>
+            <a:endParaRPr lang="en-US" altLang="ko-KR" sz="2400" dirty="0"/>
+          </a:p>
+          <a:p>
+            <a:pPr marL="0" indent="0" algn="ctr">
+              <a:buNone/>
+            </a:pPr>
+            <a:r>
+              <a:rPr lang="ko-KR" altLang="en-US" sz="2400" dirty="0"/>
+              <a:t>정보처리기능사 시험 준비를 동시에 시작했습니다</a:t>
+            </a:r>
+            <a:r>
+              <a:rPr lang="en-US" altLang="ko-KR" sz="2400" dirty="0"/>
+              <a:t>.</a:t>
+            </a:r>
+            <a:br>
+              <a:rPr lang="en-US" altLang="ko-KR" sz="2400" dirty="0"/>
+            </a:br>
+            <a:r>
+              <a:rPr lang="ko-KR" altLang="en-US" sz="2400" dirty="0"/>
+              <a:t>계획표나 할 일 목록 없이 무작정 두 가지를 병행한 결과</a:t>
+            </a:r>
+            <a:r>
+              <a:rPr lang="en-US" altLang="ko-KR" sz="2400" dirty="0"/>
+              <a:t>, </a:t>
+            </a:r>
+          </a:p>
+          <a:p>
+            <a:pPr marL="0" indent="0" algn="ctr">
+              <a:buNone/>
+            </a:pPr>
+            <a:r>
+              <a:rPr lang="ko-KR" altLang="en-US" sz="2400" dirty="0"/>
+              <a:t>팀 프로젝트 일정이 어그러져 학원을 중도에 그만 둘 수밖에 없었습니다</a:t>
+            </a:r>
+            <a:r>
+              <a:rPr lang="en-US" altLang="ko-KR" sz="2400" dirty="0"/>
+              <a:t>.</a:t>
+            </a:r>
+            <a:br>
+              <a:rPr lang="en-US" altLang="ko-KR" sz="2400" dirty="0"/>
+            </a:br>
+            <a:r>
+              <a:rPr lang="ko-KR" altLang="en-US" sz="2400" dirty="0"/>
+              <a:t>만약 </a:t>
+            </a:r>
+            <a:r>
+              <a:rPr lang="en-US" altLang="ko-KR" sz="2400" dirty="0"/>
+              <a:t>To-Do List</a:t>
+            </a:r>
+            <a:r>
+              <a:rPr lang="ko-KR" altLang="en-US" sz="2400" dirty="0"/>
+              <a:t>를 활용해 하루하루 해야 할 일을 정리했다면</a:t>
+            </a:r>
+            <a:r>
+              <a:rPr lang="en-US" altLang="ko-KR" sz="2400" dirty="0"/>
+              <a:t>, </a:t>
+            </a:r>
+          </a:p>
+          <a:p>
+            <a:pPr marL="0" indent="0" algn="ctr">
+              <a:buNone/>
+            </a:pPr>
+            <a:r>
+              <a:rPr lang="ko-KR" altLang="en-US" sz="2400" dirty="0"/>
+              <a:t>프로젝트와 자격증 준비를 모두 성공적으로 마칠 수 있었을 것입니다</a:t>
+            </a:r>
+            <a:r>
+              <a:rPr lang="en-US" altLang="ko-KR" sz="2400" dirty="0"/>
+              <a:t>.</a:t>
+            </a:r>
+            <a:br>
+              <a:rPr lang="en-US" altLang="ko-KR" sz="2400" dirty="0"/>
+            </a:br>
+            <a:r>
+              <a:rPr lang="ko-KR" altLang="en-US" sz="2400" dirty="0"/>
+              <a:t>이 경험을 계기로</a:t>
+            </a:r>
+            <a:r>
+              <a:rPr lang="en-US" altLang="ko-KR" sz="2400" dirty="0"/>
+              <a:t>, </a:t>
+            </a:r>
+            <a:r>
+              <a:rPr lang="ko-KR" altLang="en-US" sz="2400" dirty="0"/>
+              <a:t>저는 직접 </a:t>
+            </a:r>
+            <a:r>
+              <a:rPr lang="en-US" altLang="ko-KR" sz="2400" dirty="0"/>
+              <a:t>Java </a:t>
+            </a:r>
+            <a:r>
+              <a:rPr lang="ko-KR" altLang="en-US" sz="2400" dirty="0"/>
+              <a:t>기반의 </a:t>
+            </a:r>
+            <a:r>
+              <a:rPr lang="en-US" altLang="ko-KR" sz="2400" dirty="0"/>
+              <a:t>To-Do List </a:t>
+            </a:r>
+            <a:r>
+              <a:rPr lang="ko-KR" altLang="en-US" sz="2400" dirty="0"/>
+              <a:t>프로그램을 만들어 </a:t>
+            </a:r>
+            <a:endParaRPr lang="en-US" altLang="ko-KR" sz="2400" dirty="0"/>
+          </a:p>
+          <a:p>
+            <a:pPr marL="0" indent="0" algn="ctr">
+              <a:buNone/>
+            </a:pPr>
+            <a:r>
+              <a:rPr lang="ko-KR" altLang="en-US" sz="2400" dirty="0"/>
+              <a:t>‘효율적인 일정 </a:t>
+            </a:r>
+            <a:r>
+              <a:rPr lang="ko-KR" altLang="en-US" sz="2400" dirty="0" err="1"/>
+              <a:t>관리’와</a:t>
+            </a:r>
+            <a:r>
+              <a:rPr lang="ko-KR" altLang="en-US" sz="2400" dirty="0"/>
+              <a:t> ‘</a:t>
+            </a:r>
+            <a:r>
+              <a:rPr lang="en-US" altLang="ko-KR" sz="2400" dirty="0"/>
+              <a:t>CRUD </a:t>
+            </a:r>
+            <a:r>
+              <a:rPr lang="ko-KR" altLang="en-US" sz="2400" dirty="0"/>
+              <a:t>기초 역량’ 두 마리 토끼를 잡고자 합니다</a:t>
+            </a:r>
+            <a:r>
+              <a:rPr lang="en-US" altLang="ko-KR" sz="2400"/>
+              <a:t>.</a:t>
+            </a:r>
+            <a:endParaRPr lang="ko-KR" altLang="en-US" sz="2400" dirty="0"/>
+          </a:p>
+        </p:txBody>
+      </p:sp>
+      <p:sp>
+        <p:nvSpPr>
+          <p:cNvPr id="3" name="제목 2">
+            <a:extLst>
+              <a:ext uri="{FF2B5EF4-FFF2-40B4-BE49-F238E27FC236}">
+                <a16:creationId xmlns:a16="http://schemas.microsoft.com/office/drawing/2014/main" id="{4882CB49-2F52-46ED-5632-37509BF8AC94}"/>
+              </a:ext>
+            </a:extLst>
+          </p:cNvPr>
+          <p:cNvSpPr>
+            <a:spLocks noGrp="1"/>
+          </p:cNvSpPr>
+          <p:nvPr>
+            <p:ph type="title"/>
+          </p:nvPr>
+        </p:nvSpPr>
         <p:spPr/>
         <p:txBody>
           <a:bodyPr/>
           <a:lstStyle/>
           <a:p>
             <a:r>
+              <a:rPr lang="en-US" altLang="ko-KR" dirty="0"/>
+              <a:t>1. </a:t>
+            </a:r>
+            <a:r>
               <a:rPr lang="ko-KR" altLang="en-US" dirty="0"/>
-              <a:t>목록</a:t>
+              <a:t>프로젝트 개요</a:t>
             </a:r>
           </a:p>
         </p:txBody>
@@ -8451,7 +11682,295 @@
     </p:spTree>
     <p:extLst>
       <p:ext uri="{BB962C8B-B14F-4D97-AF65-F5344CB8AC3E}">
-        <p14:creationId xmlns:p14="http://schemas.microsoft.com/office/powerpoint/2010/main" val="555791236"/>
+        <p14:creationId xmlns:p14="http://schemas.microsoft.com/office/powerpoint/2010/main" val="2971052301"/>
+      </p:ext>
+    </p:extLst>
+  </p:cSld>
+  <p:clrMapOvr>
+    <a:masterClrMapping/>
+  </p:clrMapOvr>
+</p:sld>
+</file>
+
+<file path=ppt/slides/slide4.xml><?xml version="1.0" encoding="utf-8"?>
+<p:sld xmlns:a="http://schemas.openxmlformats.org/drawingml/2006/main" xmlns:r="http://schemas.openxmlformats.org/officeDocument/2006/relationships" xmlns:p="http://schemas.openxmlformats.org/presentationml/2006/main">
+  <p:cSld>
+    <p:spTree>
+      <p:nvGrpSpPr>
+        <p:cNvPr id="1" name="">
+          <a:extLst>
+            <a:ext uri="{FF2B5EF4-FFF2-40B4-BE49-F238E27FC236}">
+              <a16:creationId xmlns:a16="http://schemas.microsoft.com/office/drawing/2014/main" id="{3C07B3C6-9397-CA2A-A17B-FBA915149F01}"/>
+            </a:ext>
+          </a:extLst>
+        </p:cNvPr>
+        <p:cNvGrpSpPr/>
+        <p:nvPr/>
+      </p:nvGrpSpPr>
+      <p:grpSpPr>
+        <a:xfrm>
+          <a:off x="0" y="0"/>
+          <a:ext cx="0" cy="0"/>
+          <a:chOff x="0" y="0"/>
+          <a:chExt cx="0" cy="0"/>
+        </a:xfrm>
+      </p:grpSpPr>
+      <p:sp>
+        <p:nvSpPr>
+          <p:cNvPr id="3" name="제목 2">
+            <a:extLst>
+              <a:ext uri="{FF2B5EF4-FFF2-40B4-BE49-F238E27FC236}">
+                <a16:creationId xmlns:a16="http://schemas.microsoft.com/office/drawing/2014/main" id="{5049228E-146C-0FCA-4CD8-0F0A97981CAB}"/>
+              </a:ext>
+            </a:extLst>
+          </p:cNvPr>
+          <p:cNvSpPr>
+            <a:spLocks noGrp="1"/>
+          </p:cNvSpPr>
+          <p:nvPr>
+            <p:ph type="title"/>
+          </p:nvPr>
+        </p:nvSpPr>
+        <p:spPr/>
+        <p:txBody>
+          <a:bodyPr/>
+          <a:lstStyle/>
+          <a:p>
+            <a:r>
+              <a:rPr lang="en-US" altLang="ko-KR" dirty="0"/>
+              <a:t>2. </a:t>
+            </a:r>
+            <a:r>
+              <a:rPr lang="ko-KR" altLang="en-US" dirty="0"/>
+              <a:t>개발 환경</a:t>
+            </a:r>
+          </a:p>
+        </p:txBody>
+      </p:sp>
+      <p:sp>
+        <p:nvSpPr>
+          <p:cNvPr id="7" name="직사각형 6">
+            <a:extLst>
+              <a:ext uri="{FF2B5EF4-FFF2-40B4-BE49-F238E27FC236}">
+                <a16:creationId xmlns:a16="http://schemas.microsoft.com/office/drawing/2014/main" id="{E2F14016-0F08-AC9A-19E8-2AC8EEFE0DBC}"/>
+              </a:ext>
+            </a:extLst>
+          </p:cNvPr>
+          <p:cNvSpPr/>
+          <p:nvPr/>
+        </p:nvSpPr>
+        <p:spPr>
+          <a:xfrm>
+            <a:off x="1371600" y="3233057"/>
+            <a:ext cx="1143000" cy="1143000"/>
+          </a:xfrm>
+          <a:prstGeom prst="rect">
+            <a:avLst/>
+          </a:prstGeom>
+          <a:blipFill>
+            <a:blip r:embed="rId2"/>
+            <a:stretch>
+              <a:fillRect/>
+            </a:stretch>
+          </a:blipFill>
+          <a:ln>
+            <a:noFill/>
+          </a:ln>
+        </p:spPr>
+        <p:style>
+          <a:lnRef idx="2">
+            <a:schemeClr val="accent1">
+              <a:shade val="15000"/>
+            </a:schemeClr>
+          </a:lnRef>
+          <a:fillRef idx="1">
+            <a:schemeClr val="accent1"/>
+          </a:fillRef>
+          <a:effectRef idx="0">
+            <a:schemeClr val="accent1"/>
+          </a:effectRef>
+          <a:fontRef idx="minor">
+            <a:schemeClr val="lt1"/>
+          </a:fontRef>
+        </p:style>
+        <p:txBody>
+          <a:bodyPr rtlCol="0" anchor="ctr"/>
+          <a:lstStyle/>
+          <a:p>
+            <a:pPr algn="ctr"/>
+            <a:endParaRPr lang="ko-KR" altLang="en-US"/>
+          </a:p>
+        </p:txBody>
+      </p:sp>
+      <p:sp>
+        <p:nvSpPr>
+          <p:cNvPr id="8" name="직사각형 7">
+            <a:extLst>
+              <a:ext uri="{FF2B5EF4-FFF2-40B4-BE49-F238E27FC236}">
+                <a16:creationId xmlns:a16="http://schemas.microsoft.com/office/drawing/2014/main" id="{8AC46F2B-E3D4-5BDE-79D3-E50FF45823A9}"/>
+              </a:ext>
+            </a:extLst>
+          </p:cNvPr>
+          <p:cNvSpPr/>
+          <p:nvPr/>
+        </p:nvSpPr>
+        <p:spPr>
+          <a:xfrm>
+            <a:off x="3712028" y="3042557"/>
+            <a:ext cx="1524000" cy="1524000"/>
+          </a:xfrm>
+          <a:prstGeom prst="rect">
+            <a:avLst/>
+          </a:prstGeom>
+          <a:blipFill>
+            <a:blip r:embed="rId3"/>
+            <a:stretch>
+              <a:fillRect/>
+            </a:stretch>
+          </a:blipFill>
+          <a:ln>
+            <a:noFill/>
+          </a:ln>
+        </p:spPr>
+        <p:style>
+          <a:lnRef idx="2">
+            <a:schemeClr val="accent1">
+              <a:shade val="15000"/>
+            </a:schemeClr>
+          </a:lnRef>
+          <a:fillRef idx="1">
+            <a:schemeClr val="accent1"/>
+          </a:fillRef>
+          <a:effectRef idx="0">
+            <a:schemeClr val="accent1"/>
+          </a:effectRef>
+          <a:fontRef idx="minor">
+            <a:schemeClr val="lt1"/>
+          </a:fontRef>
+        </p:style>
+        <p:txBody>
+          <a:bodyPr rtlCol="0" anchor="ctr"/>
+          <a:lstStyle/>
+          <a:p>
+            <a:pPr algn="ctr"/>
+            <a:endParaRPr lang="ko-KR" altLang="en-US"/>
+          </a:p>
+        </p:txBody>
+      </p:sp>
+      <p:sp>
+        <p:nvSpPr>
+          <p:cNvPr id="12" name="직사각형 11">
+            <a:extLst>
+              <a:ext uri="{FF2B5EF4-FFF2-40B4-BE49-F238E27FC236}">
+                <a16:creationId xmlns:a16="http://schemas.microsoft.com/office/drawing/2014/main" id="{7A61A2AA-D79D-68F2-B79C-3E78C689048B}"/>
+              </a:ext>
+            </a:extLst>
+          </p:cNvPr>
+          <p:cNvSpPr/>
+          <p:nvPr/>
+        </p:nvSpPr>
+        <p:spPr>
+          <a:xfrm>
+            <a:off x="8773884" y="2852057"/>
+            <a:ext cx="1905000" cy="1905000"/>
+          </a:xfrm>
+          <a:prstGeom prst="rect">
+            <a:avLst/>
+          </a:prstGeom>
+          <a:blipFill>
+            <a:blip r:embed="rId4"/>
+            <a:stretch>
+              <a:fillRect/>
+            </a:stretch>
+          </a:blipFill>
+          <a:ln>
+            <a:noFill/>
+          </a:ln>
+        </p:spPr>
+        <p:style>
+          <a:lnRef idx="2">
+            <a:schemeClr val="accent1">
+              <a:shade val="15000"/>
+            </a:schemeClr>
+          </a:lnRef>
+          <a:fillRef idx="1">
+            <a:schemeClr val="accent1"/>
+          </a:fillRef>
+          <a:effectRef idx="0">
+            <a:schemeClr val="accent1"/>
+          </a:effectRef>
+          <a:fontRef idx="minor">
+            <a:schemeClr val="lt1"/>
+          </a:fontRef>
+        </p:style>
+        <p:txBody>
+          <a:bodyPr rtlCol="0" anchor="ctr"/>
+          <a:lstStyle/>
+          <a:p>
+            <a:pPr algn="ctr"/>
+            <a:endParaRPr lang="ko-KR" altLang="en-US"/>
+          </a:p>
+        </p:txBody>
+      </p:sp>
+      <p:sp>
+        <p:nvSpPr>
+          <p:cNvPr id="13" name="직사각형 12">
+            <a:extLst>
+              <a:ext uri="{FF2B5EF4-FFF2-40B4-BE49-F238E27FC236}">
+                <a16:creationId xmlns:a16="http://schemas.microsoft.com/office/drawing/2014/main" id="{6D157E03-A48E-D83E-3687-234EED9785B2}"/>
+              </a:ext>
+            </a:extLst>
+          </p:cNvPr>
+          <p:cNvSpPr/>
+          <p:nvPr/>
+        </p:nvSpPr>
+        <p:spPr>
+          <a:xfrm>
+            <a:off x="6433456" y="3233057"/>
+            <a:ext cx="1143000" cy="1143000"/>
+          </a:xfrm>
+          <a:prstGeom prst="rect">
+            <a:avLst/>
+          </a:prstGeom>
+          <a:blipFill>
+            <a:blip r:embed="rId5"/>
+            <a:stretch>
+              <a:fillRect/>
+            </a:stretch>
+          </a:blipFill>
+          <a:ln>
+            <a:noFill/>
+          </a:ln>
+        </p:spPr>
+        <p:style>
+          <a:lnRef idx="2">
+            <a:schemeClr val="accent1">
+              <a:shade val="15000"/>
+            </a:schemeClr>
+          </a:lnRef>
+          <a:fillRef idx="1">
+            <a:schemeClr val="accent1"/>
+          </a:fillRef>
+          <a:effectRef idx="0">
+            <a:schemeClr val="accent1"/>
+          </a:effectRef>
+          <a:fontRef idx="minor">
+            <a:schemeClr val="lt1"/>
+          </a:fontRef>
+        </p:style>
+        <p:txBody>
+          <a:bodyPr rtlCol="0" anchor="ctr"/>
+          <a:lstStyle/>
+          <a:p>
+            <a:pPr algn="ctr"/>
+            <a:endParaRPr lang="ko-KR" altLang="en-US"/>
+          </a:p>
+        </p:txBody>
+      </p:sp>
+    </p:spTree>
+    <p:extLst>
+      <p:ext uri="{BB962C8B-B14F-4D97-AF65-F5344CB8AC3E}">
+        <p14:creationId xmlns:p14="http://schemas.microsoft.com/office/powerpoint/2010/main" val="1043154489"/>
       </p:ext>
     </p:extLst>
   </p:cSld>

</xml_diff>